<commit_message>
Deployed 54edc9d with MkDocs version: 1.1.2
</commit_message>
<xml_diff>
--- a/aulas/13-processos/slides.pptx
+++ b/aulas/13-processos/slides.pptx
@@ -45,6 +45,8 @@
     <p:sldId id="290" r:id="rId43"/>
     <p:sldId id="291" r:id="rId44"/>
     <p:sldId id="292" r:id="rId45"/>
+    <p:sldId id="293" r:id="rId46"/>
+    <p:sldId id="294" r:id="rId47"/>
   </p:sldIdLst>
   <p:sldSz cx="9143424" cy="6857568" type="custom"/>
   <p:notesSz cx="6857568" cy="9143424"/>
@@ -19003,7 +19005,7 @@
 
 <file path=ppt/slides/slide33.xml><?xml version="1.0" encoding="utf-8"?>
 <p:sld xmlns:a="http://schemas.openxmlformats.org/drawingml/2006/main" xmlns:r="http://schemas.openxmlformats.org/officeDocument/2006/relationships" xmlns:p="http://schemas.openxmlformats.org/presentationml/2006/main" xmlns:m="http://schemas.openxmlformats.org/officeDocument/2006/math" xmlns:w="http://schemas.openxmlformats.org/wordprocessingml/2006/main" showMasterPhAnim="0" show="1">
-  <p:cSld name="page31">
+  <p:cSld name="">
     <p:spTree>
       <p:nvGrpSpPr>
         <p:cNvPr id="1" name="" hidden="0"/>
@@ -19021,15 +19023,13 @@
       <p:sp>
         <p:nvSpPr>
           <p:cNvPr id="4" name="CustomShape 1" hidden="0"/>
-          <p:cNvSpPr>
-            <a:spLocks noGrp="1"/>
-          </p:cNvSpPr>
-          <p:nvPr isPhoto="0" userDrawn="0"/>
-        </p:nvSpPr>
-        <p:spPr bwMode="auto">
-          <a:xfrm flipH="0" flipV="0">
-            <a:off x="457171" y="284742"/>
-            <a:ext cx="8228001" cy="1114489"/>
+          <p:cNvSpPr/>
+          <p:nvPr isPhoto="0" userDrawn="0"/>
+        </p:nvSpPr>
+        <p:spPr bwMode="auto">
+          <a:xfrm>
+            <a:off x="457171" y="781150"/>
+            <a:ext cx="8228001" cy="618080"/>
           </a:xfrm>
           <a:prstGeom prst="rect">
             <a:avLst/>
@@ -19039,49 +19039,47 @@
             <a:noFill/>
           </a:ln>
         </p:spPr>
-        <p:txBody>
-          <a:bodyPr lIns="89993" tIns="44996" rIns="89993" bIns="44996" anchor="t"/>
-          <a:lstStyle/>
-          <a:p>
-            <a:pPr algn="l">
-              <a:lnSpc>
-                <a:spcPct val="100000"/>
-              </a:lnSpc>
-              <a:spcBef>
-                <a:spcPts val="0"/>
-              </a:spcBef>
-              <a:spcAft>
-                <a:spcPts val="0"/>
-              </a:spcAft>
-              <a:defRPr/>
-            </a:pPr>
-            <a:r>
-              <a:rPr sz="3200" u="none">
+        <p:style>
+          <a:lnRef idx="0"/>
+          <a:fillRef idx="0"/>
+          <a:effectRef idx="0"/>
+          <a:fontRef idx="minor"/>
+        </p:style>
+        <p:txBody>
+          <a:bodyPr lIns="90000" tIns="45000" rIns="90000" bIns="45000"/>
+          <a:p>
+            <a:pPr>
+              <a:lnSpc>
+                <a:spcPct val="100000"/>
+              </a:lnSpc>
+              <a:defRPr/>
+            </a:pPr>
+            <a:r>
+              <a:rPr lang="pt-BR" sz="3200" b="0" strike="noStrike" spc="0">
                 <a:solidFill>
                   <a:srgbClr val="C00026"/>
                 </a:solidFill>
                 <a:latin typeface="Verdana"/>
                 <a:ea typeface="Verdana"/>
-                <a:cs typeface="DejaVu Sans"/>
-              </a:rPr>
-              <a:t>Valor de retorno</a:t>
-            </a:r>
-            <a:endParaRPr/>
+              </a:rPr>
+              <a:t>Parentesco de processos</a:t>
+            </a:r>
+            <a:endParaRPr lang="pt-BR" sz="3200" b="0" strike="noStrike" spc="0">
+              <a:latin typeface="Arial"/>
+            </a:endParaRPr>
           </a:p>
         </p:txBody>
       </p:sp>
       <p:sp>
         <p:nvSpPr>
           <p:cNvPr id="5" name="CustomShape 2" hidden="0"/>
-          <p:cNvSpPr>
-            <a:spLocks noGrp="1"/>
-          </p:cNvSpPr>
-          <p:nvPr isPhoto="0" userDrawn="0"/>
-        </p:nvSpPr>
-        <p:spPr bwMode="auto">
-          <a:xfrm flipH="0" flipV="0">
-            <a:off x="333339" y="1629977"/>
-            <a:ext cx="8027854" cy="4722902"/>
+          <p:cNvSpPr/>
+          <p:nvPr isPhoto="0" userDrawn="0"/>
+        </p:nvSpPr>
+        <p:spPr bwMode="auto">
+          <a:xfrm>
+            <a:off x="161989" y="85674"/>
+            <a:ext cx="7227984" cy="351337"/>
           </a:xfrm>
           <a:prstGeom prst="rect">
             <a:avLst/>
@@ -19091,187 +19089,23 @@
             <a:noFill/>
           </a:ln>
         </p:spPr>
-        <p:txBody>
-          <a:bodyPr lIns="89993" tIns="44996" rIns="89993" bIns="44996" anchor="t"/>
-          <a:lstStyle/>
-          <a:p>
-            <a:pPr marL="0" marR="0" lvl="0" indent="215986" algn="l">
-              <a:lnSpc>
-                <a:spcPct val="100000"/>
-              </a:lnSpc>
-              <a:spcBef>
-                <a:spcPts val="1695"/>
-              </a:spcBef>
-              <a:spcAft>
-                <a:spcPts val="1134"/>
-              </a:spcAft>
-              <a:buSzPct val="45000"/>
-              <a:buFont typeface="StarSymbol"/>
-              <a:buChar char="●"/>
-              <a:defRPr/>
-            </a:pPr>
-            <a:r>
-              <a:rPr sz="1800" u="none">
-                <a:latin typeface="Liberation Sans"/>
-                <a:ea typeface="Noto Sans CJK SC Regular"/>
-                <a:cs typeface="DejaVu Sans"/>
-              </a:rPr>
-              <a:t>Um processo pode esperar pelo fim de outro processo filho usando as funções</a:t>
-            </a:r>
-            <a:endParaRPr/>
-          </a:p>
-          <a:p>
-            <a:pPr marL="0" marR="0" indent="0" algn="l">
-              <a:lnSpc>
-                <a:spcPct val="100000"/>
-              </a:lnSpc>
-              <a:spcBef>
-                <a:spcPts val="0"/>
-              </a:spcBef>
-              <a:spcAft>
-                <a:spcPts val="0"/>
-              </a:spcAft>
-              <a:defRPr/>
-            </a:pPr>
-            <a:r>
-              <a:rPr sz="1800" u="none">
-                <a:latin typeface="DejaVu Sans Mono"/>
-                <a:ea typeface="Noto Sans CJK SC Regular"/>
-                <a:cs typeface="DejaVu Sans"/>
-              </a:rPr>
-              <a:t>pid_t wait(int *wstatus);</a:t>
-            </a:r>
-            <a:br>
-              <a:rPr strike="noStrike"/>
-            </a:br>
-            <a:r>
-              <a:rPr sz="1800" u="none">
-                <a:latin typeface="DejaVu Sans Mono"/>
-                <a:ea typeface="Noto Sans CJK SC Regular"/>
-                <a:cs typeface="DejaVu Sans"/>
-              </a:rPr>
-              <a:t>pid_t waitpid(pid_t pid, int *wstatus, int options);</a:t>
-            </a:r>
-            <a:endParaRPr/>
-          </a:p>
-          <a:p>
-            <a:pPr marL="0" marR="0" lvl="0" indent="215986" algn="l">
-              <a:lnSpc>
-                <a:spcPct val="100000"/>
-              </a:lnSpc>
-              <a:spcBef>
-                <a:spcPts val="0"/>
-              </a:spcBef>
-              <a:spcAft>
-                <a:spcPts val="0"/>
-              </a:spcAft>
-              <a:buSzPct val="45000"/>
-              <a:buFont typeface="StarSymbol"/>
-              <a:buChar char="●"/>
-              <a:defRPr/>
-            </a:pPr>
-            <a:endParaRPr/>
-          </a:p>
-          <a:p>
-            <a:pPr marL="0" marR="0" lvl="0" indent="215986" algn="l">
-              <a:lnSpc>
-                <a:spcPct val="100000"/>
-              </a:lnSpc>
-              <a:spcBef>
-                <a:spcPts val="1695"/>
-              </a:spcBef>
-              <a:spcAft>
-                <a:spcPts val="1134"/>
-              </a:spcAft>
-              <a:buSzPct val="45000"/>
-              <a:buFont typeface="StarSymbol"/>
-              <a:buChar char="●"/>
-              <a:defRPr/>
-            </a:pPr>
-            <a:r>
-              <a:rPr sz="1800" u="none">
-                <a:latin typeface="Liberation Sans"/>
-                <a:ea typeface="Noto Sans CJK SC Regular"/>
-                <a:cs typeface="DejaVu Sans"/>
-              </a:rPr>
-              <a:t>A primeira espera qualquer um dos filhos, enquanto a segunda espera um filho (ou grupo de filhos) específico. </a:t>
-            </a:r>
-            <a:endParaRPr/>
-          </a:p>
-          <a:p>
-            <a:pPr marL="0" marR="0" lvl="0" indent="215986" algn="l">
-              <a:lnSpc>
-                <a:spcPct val="100000"/>
-              </a:lnSpc>
-              <a:spcBef>
-                <a:spcPts val="1695"/>
-              </a:spcBef>
-              <a:spcAft>
-                <a:spcPts val="1134"/>
-              </a:spcAft>
-              <a:buSzPct val="45000"/>
-              <a:buFont typeface="StarSymbol"/>
-              <a:buChar char="●"/>
-              <a:defRPr/>
-            </a:pPr>
-            <a:r>
-              <a:rPr sz="1800" u="none">
-                <a:latin typeface="Liberation Sans"/>
-                <a:ea typeface="Noto Sans CJK SC Regular"/>
-                <a:cs typeface="DejaVu Sans"/>
-              </a:rPr>
-              <a:t>Ambas bloqueiam até que um processo filho termine e retornam o pid do processo que acabou de terminar.</a:t>
-            </a:r>
-            <a:endParaRPr/>
-          </a:p>
-          <a:p>
-            <a:pPr marL="0" marR="0" lvl="0" indent="215986" algn="l">
-              <a:lnSpc>
-                <a:spcPct val="100000"/>
-              </a:lnSpc>
-              <a:spcBef>
-                <a:spcPts val="1695"/>
-              </a:spcBef>
-              <a:spcAft>
-                <a:spcPts val="1134"/>
-              </a:spcAft>
-              <a:buSzPct val="45000"/>
-              <a:buFont typeface="StarSymbol"/>
-              <a:buChar char="●"/>
-              <a:defRPr/>
-            </a:pPr>
-            <a:r>
-              <a:rPr sz="1800" u="none">
-                <a:latin typeface="Liberation Sans"/>
-                <a:ea typeface="Noto Sans CJK SC Regular"/>
-                <a:cs typeface="DejaVu Sans"/>
-              </a:rPr>
-              <a:t>O valor de retorno do processo é retornado via o ponteiro </a:t>
-            </a:r>
-            <a:r>
-              <a:rPr sz="1800" u="none">
-                <a:latin typeface="DejaVu Sans Mono"/>
-                <a:ea typeface="Noto Sans CJK SC Regular"/>
-                <a:cs typeface="DejaVu Sans"/>
-              </a:rPr>
-              <a:t>wstatus. </a:t>
-            </a:r>
-            <a:endParaRPr/>
-          </a:p>
-        </p:txBody>
+        <p:style>
+          <a:lnRef idx="0"/>
+          <a:fillRef idx="0"/>
+          <a:effectRef idx="0"/>
+          <a:fontRef idx="minor"/>
+        </p:style>
       </p:sp>
       <p:sp>
         <p:nvSpPr>
           <p:cNvPr id="6" name="CustomShape 3" hidden="0"/>
-          <p:cNvSpPr>
-            <a:spLocks noGrp="1"/>
-          </p:cNvSpPr>
-          <p:nvPr isPhoto="0" userDrawn="0"/>
-        </p:nvSpPr>
-        <p:spPr bwMode="auto">
-          <a:xfrm flipH="0" flipV="0">
-            <a:off x="161989" y="85674"/>
-            <a:ext cx="7227984" cy="351337"/>
+          <p:cNvSpPr/>
+          <p:nvPr isPhoto="0" userDrawn="0"/>
+        </p:nvSpPr>
+        <p:spPr bwMode="auto">
+          <a:xfrm>
+            <a:off x="84234" y="6401836"/>
+            <a:ext cx="640399" cy="363936"/>
           </a:xfrm>
           <a:prstGeom prst="rect">
             <a:avLst/>
@@ -19281,61 +19115,60 @@
             <a:noFill/>
           </a:ln>
         </p:spPr>
-        <p:txBody>
-          <a:bodyPr lIns="89993" tIns="44996" rIns="89993" bIns="44996" anchor="t"/>
-          <a:p>
-            <a:pPr>
-              <a:defRPr/>
-            </a:pPr>
-            <a:endParaRPr/>
-          </a:p>
-        </p:txBody>
-      </p:sp>
-      <p:sp>
-        <p:nvSpPr>
-          <p:cNvPr id="7" name="CustomShape 4" hidden="0"/>
-          <p:cNvSpPr>
-            <a:spLocks noGrp="1"/>
-          </p:cNvSpPr>
-          <p:nvPr isPhoto="0" userDrawn="0"/>
-        </p:nvSpPr>
-        <p:spPr bwMode="auto">
-          <a:xfrm flipH="0" flipV="0">
-            <a:off x="84234" y="6401836"/>
-            <a:ext cx="640399" cy="363937"/>
-          </a:xfrm>
-          <a:prstGeom prst="rect">
-            <a:avLst/>
-          </a:prstGeom>
-          <a:noFill/>
+        <p:style>
+          <a:lnRef idx="0"/>
+          <a:fillRef idx="0"/>
+          <a:effectRef idx="0"/>
+          <a:fontRef idx="minor"/>
+        </p:style>
+        <p:txBody>
+          <a:bodyPr lIns="90000" tIns="45000" rIns="90000" bIns="45000" anchor="ctr"/>
+          <a:p>
+            <a:pPr algn="r">
+              <a:lnSpc>
+                <a:spcPct val="100000"/>
+              </a:lnSpc>
+              <a:defRPr/>
+            </a:pPr>
+            <a:fld id="{5551F950-27D0-8FE4-6D2B-3017BA2E4A56}" type="slidenum">
+              <a:rPr lang="pt-BR" sz="1000" b="0" strike="noStrike" spc="0">
+                <a:solidFill>
+                  <a:srgbClr val="B2B2B2"/>
+                </a:solidFill>
+                <a:latin typeface="Verdana"/>
+                <a:ea typeface="Verdana"/>
+              </a:rPr>
+              <a:t/>
+            </a:fld>
+            <a:endParaRPr lang="pt-BR" sz="1000" b="0" strike="noStrike" spc="0">
+              <a:latin typeface="Arial"/>
+            </a:endParaRPr>
+          </a:p>
+        </p:txBody>
+      </p:sp>
+      <p:pic>
+        <p:nvPicPr>
+          <p:cNvPr id="7" name="" descr="" hidden="0"/>
+          <p:cNvPicPr/>
+          <p:nvPr isPhoto="0" userDrawn="0"/>
+        </p:nvPicPr>
+        <p:blipFill>
+          <a:blip r:embed="rId2"/>
+          <a:stretch/>
+        </p:blipFill>
+        <p:spPr bwMode="auto">
+          <a:xfrm>
+            <a:off x="1664534" y="1727890"/>
+            <a:ext cx="5738398" cy="4679705"/>
+          </a:xfrm>
+          <a:prstGeom prst="rect">
+            <a:avLst/>
+          </a:prstGeom>
           <a:ln>
             <a:noFill/>
           </a:ln>
         </p:spPr>
-        <p:txBody>
-          <a:bodyPr lIns="89993" tIns="44996" rIns="89993" bIns="44996" anchor="ctr"/>
-          <a:lstStyle/>
-          <a:p>
-            <a:pPr algn="r">
-              <a:lnSpc>
-                <a:spcPct val="100000"/>
-              </a:lnSpc>
-              <a:spcBef>
-                <a:spcPts val="0"/>
-              </a:spcBef>
-              <a:spcAft>
-                <a:spcPts val="0"/>
-              </a:spcAft>
-              <a:defRPr/>
-            </a:pPr>
-            <a:fld id="{5CC2A059-B141-45A7-B910-B096D6D06820}" type="slidenum">
-              <a:rPr/>
-              <a:t/>
-            </a:fld>
-            <a:endParaRPr/>
-          </a:p>
-        </p:txBody>
-      </p:sp>
+      </p:pic>
     </p:spTree>
   </p:cSld>
   <p:clrMapOvr>
@@ -19354,7 +19187,7 @@
 
 <file path=ppt/slides/slide34.xml><?xml version="1.0" encoding="utf-8"?>
 <p:sld xmlns:a="http://schemas.openxmlformats.org/drawingml/2006/main" xmlns:r="http://schemas.openxmlformats.org/officeDocument/2006/relationships" xmlns:p="http://schemas.openxmlformats.org/presentationml/2006/main" xmlns:m="http://schemas.openxmlformats.org/officeDocument/2006/math" xmlns:w="http://schemas.openxmlformats.org/wordprocessingml/2006/main" showMasterPhAnim="0" show="1">
-  <p:cSld name="page32">
+  <p:cSld name="page31">
     <p:spTree>
       <p:nvGrpSpPr>
         <p:cNvPr id="1" name="" hidden="0"/>
@@ -19415,7 +19248,7 @@
                 <a:ea typeface="Verdana"/>
                 <a:cs typeface="DejaVu Sans"/>
               </a:rPr>
-              <a:t>E se o processo filho deu ruim?</a:t>
+              <a:t>Valor de retorno</a:t>
             </a:r>
             <a:endParaRPr/>
           </a:p>
@@ -19446,209 +19279,168 @@
           <a:bodyPr lIns="89993" tIns="44996" rIns="89993" bIns="44996" anchor="t"/>
           <a:lstStyle/>
           <a:p>
-            <a:pPr marL="283879" lvl="1" indent="-283879" algn="l">
-              <a:lnSpc>
-                <a:spcPct val="100000"/>
-              </a:lnSpc>
-              <a:spcBef>
-                <a:spcPts val="1977"/>
-              </a:spcBef>
-              <a:spcAft>
-                <a:spcPts val="1417"/>
-              </a:spcAft>
-              <a:buFont typeface="Arial"/>
-              <a:buChar char="•"/>
-              <a:defRPr/>
-            </a:pPr>
-            <a:r>
-              <a:rPr sz="2000" u="none">
+            <a:pPr marL="0" marR="0" lvl="0" indent="215986" algn="l">
+              <a:lnSpc>
+                <a:spcPct val="100000"/>
+              </a:lnSpc>
+              <a:spcBef>
+                <a:spcPts val="1695"/>
+              </a:spcBef>
+              <a:spcAft>
+                <a:spcPts val="1134"/>
+              </a:spcAft>
+              <a:buSzPct val="45000"/>
+              <a:buFont typeface="StarSymbol"/>
+              <a:buChar char="●"/>
+              <a:defRPr/>
+            </a:pPr>
+            <a:r>
+              <a:rPr sz="1800" u="none">
                 <a:latin typeface="Liberation Sans"/>
                 <a:ea typeface="Noto Sans CJK SC Regular"/>
                 <a:cs typeface="DejaVu Sans"/>
               </a:rPr>
-              <a:t>É possível checar se um processo filho terminou corretamente usando o conteúdo de </a:t>
-            </a:r>
-            <a:r>
-              <a:rPr sz="2000" u="none">
+              <a:t>Um processo pode esperar pelo fim de outro processo filho usando as funções</a:t>
+            </a:r>
+            <a:endParaRPr/>
+          </a:p>
+          <a:p>
+            <a:pPr marL="0" marR="0" indent="0" algn="l">
+              <a:lnSpc>
+                <a:spcPct val="100000"/>
+              </a:lnSpc>
+              <a:spcBef>
+                <a:spcPts val="0"/>
+              </a:spcBef>
+              <a:spcAft>
+                <a:spcPts val="0"/>
+              </a:spcAft>
+              <a:defRPr/>
+            </a:pPr>
+            <a:r>
+              <a:rPr sz="1800" u="none">
                 <a:latin typeface="DejaVu Sans Mono"/>
                 <a:ea typeface="Noto Sans CJK SC Regular"/>
                 <a:cs typeface="DejaVu Sans"/>
               </a:rPr>
-              <a:t>wstatus</a:t>
-            </a:r>
-            <a:r>
-              <a:rPr sz="2000" u="none">
+              <a:t>pid_t wait(int *wstatus);</a:t>
+            </a:r>
+            <a:br>
+              <a:rPr strike="noStrike"/>
+            </a:br>
+            <a:r>
+              <a:rPr sz="1800" u="none">
+                <a:latin typeface="DejaVu Sans Mono"/>
+                <a:ea typeface="Noto Sans CJK SC Regular"/>
+                <a:cs typeface="DejaVu Sans"/>
+              </a:rPr>
+              <a:t>pid_t waitpid(pid_t pid, int *wstatus, int options);</a:t>
+            </a:r>
+            <a:endParaRPr/>
+          </a:p>
+          <a:p>
+            <a:pPr marL="0" marR="0" lvl="0" indent="215986" algn="l">
+              <a:lnSpc>
+                <a:spcPct val="100000"/>
+              </a:lnSpc>
+              <a:spcBef>
+                <a:spcPts val="0"/>
+              </a:spcBef>
+              <a:spcAft>
+                <a:spcPts val="0"/>
+              </a:spcAft>
+              <a:buSzPct val="45000"/>
+              <a:buFont typeface="StarSymbol"/>
+              <a:buChar char="●"/>
+              <a:defRPr/>
+            </a:pPr>
+            <a:endParaRPr/>
+          </a:p>
+          <a:p>
+            <a:pPr marL="0" marR="0" lvl="0" indent="215986" algn="l">
+              <a:lnSpc>
+                <a:spcPct val="100000"/>
+              </a:lnSpc>
+              <a:spcBef>
+                <a:spcPts val="1695"/>
+              </a:spcBef>
+              <a:spcAft>
+                <a:spcPts val="1134"/>
+              </a:spcAft>
+              <a:buSzPct val="45000"/>
+              <a:buFont typeface="StarSymbol"/>
+              <a:buChar char="●"/>
+              <a:defRPr/>
+            </a:pPr>
+            <a:r>
+              <a:rPr sz="1800" u="none">
                 <a:latin typeface="Liberation Sans"/>
                 <a:ea typeface="Noto Sans CJK SC Regular"/>
                 <a:cs typeface="DejaVu Sans"/>
               </a:rPr>
-              <a:t> e as seguintes macros:</a:t>
-            </a:r>
-            <a:endParaRPr sz="1100"/>
-          </a:p>
-          <a:p>
-            <a:pPr marL="283879" lvl="1" indent="-283879" algn="l">
-              <a:lnSpc>
-                <a:spcPct val="100000"/>
-              </a:lnSpc>
-              <a:spcBef>
-                <a:spcPts val="1977"/>
-              </a:spcBef>
-              <a:spcAft>
-                <a:spcPts val="1417"/>
-              </a:spcAft>
-              <a:buFont typeface="Arial"/>
-              <a:buChar char="•"/>
-              <a:defRPr/>
-            </a:pPr>
-            <a:r>
-              <a:rPr sz="2000" u="none">
+              <a:t>A primeira espera qualquer um dos filhos, enquanto a segunda espera um filho (ou grupo de filhos) específico. </a:t>
+            </a:r>
+            <a:endParaRPr/>
+          </a:p>
+          <a:p>
+            <a:pPr marL="0" marR="0" lvl="0" indent="215986" algn="l">
+              <a:lnSpc>
+                <a:spcPct val="100000"/>
+              </a:lnSpc>
+              <a:spcBef>
+                <a:spcPts val="1695"/>
+              </a:spcBef>
+              <a:spcAft>
+                <a:spcPts val="1134"/>
+              </a:spcAft>
+              <a:buSzPct val="45000"/>
+              <a:buFont typeface="StarSymbol"/>
+              <a:buChar char="●"/>
+              <a:defRPr/>
+            </a:pPr>
+            <a:r>
+              <a:rPr sz="1800" u="none">
+                <a:latin typeface="Liberation Sans"/>
+                <a:ea typeface="Noto Sans CJK SC Regular"/>
+                <a:cs typeface="DejaVu Sans"/>
+              </a:rPr>
+              <a:t>Ambas bloqueiam até que um processo filho termine e retornam o pid do processo que acabou de terminar.</a:t>
+            </a:r>
+            <a:endParaRPr/>
+          </a:p>
+          <a:p>
+            <a:pPr marL="0" marR="0" lvl="0" indent="215986" algn="l">
+              <a:lnSpc>
+                <a:spcPct val="100000"/>
+              </a:lnSpc>
+              <a:spcBef>
+                <a:spcPts val="1695"/>
+              </a:spcBef>
+              <a:spcAft>
+                <a:spcPts val="1134"/>
+              </a:spcAft>
+              <a:buSzPct val="45000"/>
+              <a:buFont typeface="StarSymbol"/>
+              <a:buChar char="●"/>
+              <a:defRPr/>
+            </a:pPr>
+            <a:r>
+              <a:rPr sz="1800" u="none">
+                <a:latin typeface="Liberation Sans"/>
+                <a:ea typeface="Noto Sans CJK SC Regular"/>
+                <a:cs typeface="DejaVu Sans"/>
+              </a:rPr>
+              <a:t>O valor de retorno do processo é retornado via o ponteiro </a:t>
+            </a:r>
+            <a:r>
+              <a:rPr sz="1800" u="none">
                 <a:latin typeface="DejaVu Sans Mono"/>
                 <a:ea typeface="Noto Sans CJK SC Regular"/>
                 <a:cs typeface="DejaVu Sans"/>
               </a:rPr>
-              <a:t>WIFEXITED(wstatus)</a:t>
-            </a:r>
-            <a:r>
-              <a:rPr sz="2000" u="none">
-                <a:latin typeface="Liberation Sans"/>
-                <a:ea typeface="Noto Sans CJK SC Regular"/>
-                <a:cs typeface="DejaVu Sans"/>
-              </a:rPr>
-              <a:t>: </a:t>
-            </a:r>
-            <a:r>
-              <a:rPr sz="2000" u="none">
-                <a:latin typeface="DejaVu Sans Mono"/>
-                <a:ea typeface="Noto Sans CJK SC Regular"/>
-                <a:cs typeface="DejaVu Sans"/>
-              </a:rPr>
-              <a:t>true</a:t>
-            </a:r>
-            <a:r>
-              <a:rPr sz="2000" u="none">
-                <a:latin typeface="Liberation Sans"/>
-                <a:ea typeface="Noto Sans CJK SC Regular"/>
-                <a:cs typeface="DejaVu Sans"/>
-              </a:rPr>
-              <a:t> se o filho acabou sem erros</a:t>
-            </a:r>
-            <a:endParaRPr sz="1100"/>
-          </a:p>
-          <a:p>
-            <a:pPr marL="283879" lvl="1" indent="-283879" algn="l">
-              <a:lnSpc>
-                <a:spcPct val="100000"/>
-              </a:lnSpc>
-              <a:spcBef>
-                <a:spcPts val="1977"/>
-              </a:spcBef>
-              <a:spcAft>
-                <a:spcPts val="1417"/>
-              </a:spcAft>
-              <a:buFont typeface="Arial"/>
-              <a:buChar char="•"/>
-              <a:defRPr/>
-            </a:pPr>
-            <a:r>
-              <a:rPr sz="2000" u="none">
-                <a:latin typeface="DejaVu Sans Mono"/>
-                <a:ea typeface="Noto Sans CJK SC Regular"/>
-                <a:cs typeface="DejaVu Sans"/>
-              </a:rPr>
-              <a:t>WEXITSTATUS(wstatus)</a:t>
-            </a:r>
-            <a:r>
-              <a:rPr sz="2000" u="none">
-                <a:latin typeface="Liberation Sans"/>
-                <a:ea typeface="Noto Sans CJK SC Regular"/>
-                <a:cs typeface="DejaVu Sans"/>
-              </a:rPr>
-              <a:t>: valor retornado pelo main</a:t>
-            </a:r>
-            <a:endParaRPr sz="1100"/>
-          </a:p>
-          <a:p>
-            <a:pPr marL="283879" lvl="1" indent="-283879" algn="l">
-              <a:lnSpc>
-                <a:spcPct val="100000"/>
-              </a:lnSpc>
-              <a:spcBef>
-                <a:spcPts val="1977"/>
-              </a:spcBef>
-              <a:spcAft>
-                <a:spcPts val="1417"/>
-              </a:spcAft>
-              <a:buFont typeface="Arial"/>
-              <a:buChar char="•"/>
-              <a:defRPr/>
-            </a:pPr>
-            <a:r>
-              <a:rPr sz="2000" u="none">
-                <a:latin typeface="DejaVu Sans Mono"/>
-                <a:ea typeface="Noto Sans CJK SC Regular"/>
-                <a:cs typeface="DejaVu Sans"/>
-              </a:rPr>
-              <a:t>WIFSIGNALED(wstatus)</a:t>
-            </a:r>
-            <a:r>
-              <a:rPr sz="2000" u="none">
-                <a:latin typeface="Liberation Sans"/>
-                <a:ea typeface="Noto Sans CJK SC Regular"/>
-                <a:cs typeface="DejaVu Sans"/>
-              </a:rPr>
-              <a:t>: </a:t>
-            </a:r>
-            <a:r>
-              <a:rPr sz="2000" u="none">
-                <a:latin typeface="DejaVu Sans Mono"/>
-                <a:ea typeface="Noto Sans CJK SC Regular"/>
-                <a:cs typeface="DejaVu Sans"/>
-              </a:rPr>
-              <a:t>true</a:t>
-            </a:r>
-            <a:r>
-              <a:rPr sz="2000" u="none">
-                <a:latin typeface="Liberation Sans"/>
-                <a:ea typeface="Noto Sans CJK SC Regular"/>
-                <a:cs typeface="DejaVu Sans"/>
-              </a:rPr>
-              <a:t> se o filho foi terminado de maneira abrupta (tanto por um ctrl+c quanto por um erro)</a:t>
-            </a:r>
-            <a:endParaRPr sz="1100"/>
-          </a:p>
-          <a:p>
-            <a:pPr marL="283879" lvl="1" indent="-283879" algn="l">
-              <a:lnSpc>
-                <a:spcPct val="100000"/>
-              </a:lnSpc>
-              <a:spcBef>
-                <a:spcPts val="1977"/>
-              </a:spcBef>
-              <a:spcAft>
-                <a:spcPts val="1417"/>
-              </a:spcAft>
-              <a:buFont typeface="Arial"/>
-              <a:buChar char="•"/>
-              <a:defRPr/>
-            </a:pPr>
-            <a:r>
-              <a:rPr sz="2000" u="none">
-                <a:latin typeface="DejaVu Sans Mono"/>
-                <a:ea typeface="Noto Sans CJK SC Regular"/>
-                <a:cs typeface="DejaVu Sans"/>
-              </a:rPr>
-              <a:t>WTERMSIG(wstatus)</a:t>
-            </a:r>
-            <a:r>
-              <a:rPr sz="2000" u="none">
-                <a:latin typeface="Liberation Sans"/>
-                <a:ea typeface="Noto Sans CJK SC Regular"/>
-                <a:cs typeface="DejaVu Sans"/>
-              </a:rPr>
-              <a:t>: código numérico representando a razão do encerramento do filho</a:t>
-            </a:r>
-            <a:endParaRPr sz="1100"/>
+              <a:t>wstatus. </a:t>
+            </a:r>
+            <a:endParaRPr/>
           </a:p>
         </p:txBody>
       </p:sp>
@@ -19746,7 +19538,7 @@
 
 <file path=ppt/slides/slide35.xml><?xml version="1.0" encoding="utf-8"?>
 <p:sld xmlns:a="http://schemas.openxmlformats.org/drawingml/2006/main" xmlns:r="http://schemas.openxmlformats.org/officeDocument/2006/relationships" xmlns:p="http://schemas.openxmlformats.org/presentationml/2006/main" xmlns:m="http://schemas.openxmlformats.org/officeDocument/2006/math" xmlns:w="http://schemas.openxmlformats.org/wordprocessingml/2006/main" showMasterPhAnim="0" show="1">
-  <p:cSld name="">
+  <p:cSld name="page32">
     <p:spTree>
       <p:nvGrpSpPr>
         <p:cNvPr id="1" name="" hidden="0"/>
@@ -19763,14 +19555,16 @@
       </p:grpSpPr>
       <p:sp>
         <p:nvSpPr>
-          <p:cNvPr id="4" name="Google Shape;347;p64" hidden="0"/>
-          <p:cNvSpPr/>
-          <p:nvPr isPhoto="0" userDrawn="0"/>
-        </p:nvSpPr>
-        <p:spPr bwMode="auto">
-          <a:xfrm>
-            <a:off x="457170" y="2920468"/>
-            <a:ext cx="8228000" cy="618080"/>
+          <p:cNvPr id="4" name="CustomShape 1" hidden="0"/>
+          <p:cNvSpPr>
+            <a:spLocks noGrp="1"/>
+          </p:cNvSpPr>
+          <p:nvPr isPhoto="0" userDrawn="0"/>
+        </p:nvSpPr>
+        <p:spPr bwMode="auto">
+          <a:xfrm flipH="0" flipV="0">
+            <a:off x="457171" y="284742"/>
+            <a:ext cx="8228001" cy="1114489"/>
           </a:xfrm>
           <a:prstGeom prst="rect">
             <a:avLst/>
@@ -19781,56 +19575,48 @@
           </a:ln>
         </p:spPr>
         <p:txBody>
-          <a:bodyPr spcFirstLastPara="1" wrap="square" lIns="90000" tIns="45000" rIns="90000" bIns="45000" anchor="t" anchorCtr="0">
-            <a:noAutofit/>
-          </a:bodyPr>
+          <a:bodyPr lIns="89993" tIns="44996" rIns="89993" bIns="44996" anchor="t"/>
           <a:lstStyle/>
           <a:p>
-            <a:pPr marL="0" marR="0" lvl="0" indent="0" algn="ctr">
-              <a:lnSpc>
-                <a:spcPct val="100000"/>
-              </a:lnSpc>
-              <a:spcBef>
-                <a:spcPts val="0"/>
-              </a:spcBef>
-              <a:spcAft>
-                <a:spcPts val="0"/>
-              </a:spcAft>
-              <a:buNone/>
-              <a:defRPr/>
-            </a:pPr>
-            <a:r>
-              <a:rPr lang="pt-BR" sz="3600" b="1" i="0" u="none" strike="noStrike" cap="none">
+            <a:pPr algn="l">
+              <a:lnSpc>
+                <a:spcPct val="100000"/>
+              </a:lnSpc>
+              <a:spcBef>
+                <a:spcPts val="0"/>
+              </a:spcBef>
+              <a:spcAft>
+                <a:spcPts val="0"/>
+              </a:spcAft>
+              <a:defRPr/>
+            </a:pPr>
+            <a:r>
+              <a:rPr sz="3200" u="none">
                 <a:solidFill>
                   <a:srgbClr val="C00026"/>
                 </a:solidFill>
                 <a:latin typeface="Verdana"/>
                 <a:ea typeface="Verdana"/>
-                <a:cs typeface="Verdana"/>
-              </a:rPr>
-              <a:t>Atividade prática</a:t>
-            </a:r>
-            <a:endParaRPr sz="3600" b="1" i="0" u="none" strike="noStrike" cap="none">
-              <a:solidFill>
-                <a:schemeClr val="dk1"/>
-              </a:solidFill>
-              <a:latin typeface="Arial"/>
-              <a:ea typeface="Arial"/>
-              <a:cs typeface="Arial"/>
-            </a:endParaRPr>
-          </a:p>
-        </p:txBody>
-      </p:sp>
-      <p:sp>
-        <p:nvSpPr>
-          <p:cNvPr id="5" name="Google Shape;348;p64" hidden="0"/>
-          <p:cNvSpPr/>
-          <p:nvPr isPhoto="0" userDrawn="0"/>
-        </p:nvSpPr>
-        <p:spPr bwMode="auto">
-          <a:xfrm>
-            <a:off x="161987" y="85673"/>
-            <a:ext cx="7227983" cy="351336"/>
+                <a:cs typeface="DejaVu Sans"/>
+              </a:rPr>
+              <a:t>E se o processo filho deu ruim?</a:t>
+            </a:r>
+            <a:endParaRPr/>
+          </a:p>
+        </p:txBody>
+      </p:sp>
+      <p:sp>
+        <p:nvSpPr>
+          <p:cNvPr id="5" name="CustomShape 2" hidden="0"/>
+          <p:cNvSpPr>
+            <a:spLocks noGrp="1"/>
+          </p:cNvSpPr>
+          <p:nvPr isPhoto="0" userDrawn="0"/>
+        </p:nvSpPr>
+        <p:spPr bwMode="auto">
+          <a:xfrm flipH="0" flipV="0">
+            <a:off x="333339" y="1629977"/>
+            <a:ext cx="8027854" cy="4722902"/>
           </a:xfrm>
           <a:prstGeom prst="rect">
             <a:avLst/>
@@ -19841,35 +19627,227 @@
           </a:ln>
         </p:spPr>
         <p:txBody>
-          <a:bodyPr spcFirstLastPara="1" wrap="square" lIns="91422" tIns="91422" rIns="91422" bIns="91422" anchor="ctr" anchorCtr="0">
-            <a:noAutofit/>
-          </a:bodyPr>
+          <a:bodyPr lIns="89993" tIns="44996" rIns="89993" bIns="44996" anchor="t"/>
           <a:lstStyle/>
           <a:p>
-            <a:pPr marL="0" lvl="0" indent="0" algn="l">
-              <a:spcBef>
-                <a:spcPts val="0"/>
-              </a:spcBef>
-              <a:spcAft>
-                <a:spcPts val="0"/>
-              </a:spcAft>
-              <a:buNone/>
-              <a:defRPr/>
-            </a:pPr>
-            <a:endParaRPr/>
-          </a:p>
-        </p:txBody>
-      </p:sp>
-      <p:sp>
-        <p:nvSpPr>
-          <p:cNvPr id="6" name="Google Shape;349;p64" hidden="0"/>
-          <p:cNvSpPr/>
-          <p:nvPr isPhoto="0" userDrawn="0"/>
-        </p:nvSpPr>
-        <p:spPr bwMode="auto">
-          <a:xfrm>
-            <a:off x="84233" y="6401835"/>
-            <a:ext cx="640398" cy="363936"/>
+            <a:pPr marL="283879" lvl="1" indent="-283879" algn="l">
+              <a:lnSpc>
+                <a:spcPct val="100000"/>
+              </a:lnSpc>
+              <a:spcBef>
+                <a:spcPts val="1977"/>
+              </a:spcBef>
+              <a:spcAft>
+                <a:spcPts val="1417"/>
+              </a:spcAft>
+              <a:buFont typeface="Arial"/>
+              <a:buChar char="•"/>
+              <a:defRPr/>
+            </a:pPr>
+            <a:r>
+              <a:rPr sz="2000" u="none">
+                <a:latin typeface="Liberation Sans"/>
+                <a:ea typeface="Noto Sans CJK SC Regular"/>
+                <a:cs typeface="DejaVu Sans"/>
+              </a:rPr>
+              <a:t>É possível checar se um processo filho terminou corretamente usando o conteúdo de </a:t>
+            </a:r>
+            <a:r>
+              <a:rPr sz="2000" u="none">
+                <a:latin typeface="DejaVu Sans Mono"/>
+                <a:ea typeface="Noto Sans CJK SC Regular"/>
+                <a:cs typeface="DejaVu Sans"/>
+              </a:rPr>
+              <a:t>wstatus</a:t>
+            </a:r>
+            <a:r>
+              <a:rPr sz="2000" u="none">
+                <a:latin typeface="Liberation Sans"/>
+                <a:ea typeface="Noto Sans CJK SC Regular"/>
+                <a:cs typeface="DejaVu Sans"/>
+              </a:rPr>
+              <a:t> e as seguintes macros:</a:t>
+            </a:r>
+            <a:endParaRPr sz="1100"/>
+          </a:p>
+          <a:p>
+            <a:pPr marL="283879" lvl="1" indent="-283879" algn="l">
+              <a:lnSpc>
+                <a:spcPct val="100000"/>
+              </a:lnSpc>
+              <a:spcBef>
+                <a:spcPts val="1977"/>
+              </a:spcBef>
+              <a:spcAft>
+                <a:spcPts val="1417"/>
+              </a:spcAft>
+              <a:buFont typeface="Arial"/>
+              <a:buChar char="•"/>
+              <a:defRPr/>
+            </a:pPr>
+            <a:r>
+              <a:rPr sz="2000" u="none">
+                <a:latin typeface="DejaVu Sans Mono"/>
+                <a:ea typeface="Noto Sans CJK SC Regular"/>
+                <a:cs typeface="DejaVu Sans"/>
+              </a:rPr>
+              <a:t>WIFEXITED(wstatus)</a:t>
+            </a:r>
+            <a:r>
+              <a:rPr sz="2000" u="none">
+                <a:latin typeface="Liberation Sans"/>
+                <a:ea typeface="Noto Sans CJK SC Regular"/>
+                <a:cs typeface="DejaVu Sans"/>
+              </a:rPr>
+              <a:t>: </a:t>
+            </a:r>
+            <a:r>
+              <a:rPr sz="2000" u="none">
+                <a:latin typeface="DejaVu Sans Mono"/>
+                <a:ea typeface="Noto Sans CJK SC Regular"/>
+                <a:cs typeface="DejaVu Sans"/>
+              </a:rPr>
+              <a:t>true</a:t>
+            </a:r>
+            <a:r>
+              <a:rPr sz="2000" u="none">
+                <a:latin typeface="Liberation Sans"/>
+                <a:ea typeface="Noto Sans CJK SC Regular"/>
+                <a:cs typeface="DejaVu Sans"/>
+              </a:rPr>
+              <a:t> se o filho acabou sem erros</a:t>
+            </a:r>
+            <a:endParaRPr sz="1100"/>
+          </a:p>
+          <a:p>
+            <a:pPr marL="283879" lvl="1" indent="-283879" algn="l">
+              <a:lnSpc>
+                <a:spcPct val="100000"/>
+              </a:lnSpc>
+              <a:spcBef>
+                <a:spcPts val="1977"/>
+              </a:spcBef>
+              <a:spcAft>
+                <a:spcPts val="1417"/>
+              </a:spcAft>
+              <a:buFont typeface="Arial"/>
+              <a:buChar char="•"/>
+              <a:defRPr/>
+            </a:pPr>
+            <a:r>
+              <a:rPr sz="2000" u="none">
+                <a:latin typeface="DejaVu Sans Mono"/>
+                <a:ea typeface="Noto Sans CJK SC Regular"/>
+                <a:cs typeface="DejaVu Sans"/>
+              </a:rPr>
+              <a:t>WEXITSTATUS(wstatus)</a:t>
+            </a:r>
+            <a:r>
+              <a:rPr sz="2000" u="none">
+                <a:latin typeface="Liberation Sans"/>
+                <a:ea typeface="Noto Sans CJK SC Regular"/>
+                <a:cs typeface="DejaVu Sans"/>
+              </a:rPr>
+              <a:t>: valor retornado pelo main</a:t>
+            </a:r>
+            <a:endParaRPr sz="1100"/>
+          </a:p>
+          <a:p>
+            <a:pPr marL="283879" lvl="1" indent="-283879" algn="l">
+              <a:lnSpc>
+                <a:spcPct val="100000"/>
+              </a:lnSpc>
+              <a:spcBef>
+                <a:spcPts val="1977"/>
+              </a:spcBef>
+              <a:spcAft>
+                <a:spcPts val="1417"/>
+              </a:spcAft>
+              <a:buFont typeface="Arial"/>
+              <a:buChar char="•"/>
+              <a:defRPr/>
+            </a:pPr>
+            <a:r>
+              <a:rPr sz="2000" u="none">
+                <a:latin typeface="DejaVu Sans Mono"/>
+                <a:ea typeface="Noto Sans CJK SC Regular"/>
+                <a:cs typeface="DejaVu Sans"/>
+              </a:rPr>
+              <a:t>WIFSIGNALED(wstatus)</a:t>
+            </a:r>
+            <a:r>
+              <a:rPr sz="2000" u="none">
+                <a:latin typeface="Liberation Sans"/>
+                <a:ea typeface="Noto Sans CJK SC Regular"/>
+                <a:cs typeface="DejaVu Sans"/>
+              </a:rPr>
+              <a:t>: </a:t>
+            </a:r>
+            <a:r>
+              <a:rPr sz="2000" u="none">
+                <a:latin typeface="DejaVu Sans Mono"/>
+                <a:ea typeface="Noto Sans CJK SC Regular"/>
+                <a:cs typeface="DejaVu Sans"/>
+              </a:rPr>
+              <a:t>true</a:t>
+            </a:r>
+            <a:r>
+              <a:rPr sz="2000" u="none">
+                <a:latin typeface="Liberation Sans"/>
+                <a:ea typeface="Noto Sans CJK SC Regular"/>
+                <a:cs typeface="DejaVu Sans"/>
+              </a:rPr>
+              <a:t> se o filho foi terminado de maneira abrupta (tanto por um ctrl+c quanto por um erro)</a:t>
+            </a:r>
+            <a:endParaRPr sz="1100"/>
+          </a:p>
+          <a:p>
+            <a:pPr marL="283879" lvl="1" indent="-283879" algn="l">
+              <a:lnSpc>
+                <a:spcPct val="100000"/>
+              </a:lnSpc>
+              <a:spcBef>
+                <a:spcPts val="1977"/>
+              </a:spcBef>
+              <a:spcAft>
+                <a:spcPts val="1417"/>
+              </a:spcAft>
+              <a:buFont typeface="Arial"/>
+              <a:buChar char="•"/>
+              <a:defRPr/>
+            </a:pPr>
+            <a:r>
+              <a:rPr sz="2000" u="none">
+                <a:latin typeface="DejaVu Sans Mono"/>
+                <a:ea typeface="Noto Sans CJK SC Regular"/>
+                <a:cs typeface="DejaVu Sans"/>
+              </a:rPr>
+              <a:t>WTERMSIG(wstatus)</a:t>
+            </a:r>
+            <a:r>
+              <a:rPr sz="2000" u="none">
+                <a:latin typeface="Liberation Sans"/>
+                <a:ea typeface="Noto Sans CJK SC Regular"/>
+                <a:cs typeface="DejaVu Sans"/>
+              </a:rPr>
+              <a:t>: código numérico representando a razão do encerramento do filho</a:t>
+            </a:r>
+            <a:endParaRPr sz="1100"/>
+          </a:p>
+        </p:txBody>
+      </p:sp>
+      <p:sp>
+        <p:nvSpPr>
+          <p:cNvPr id="6" name="CustomShape 3" hidden="0"/>
+          <p:cNvSpPr>
+            <a:spLocks noGrp="1"/>
+          </p:cNvSpPr>
+          <p:nvPr isPhoto="0" userDrawn="0"/>
+        </p:nvSpPr>
+        <p:spPr bwMode="auto">
+          <a:xfrm flipH="0" flipV="0">
+            <a:off x="161989" y="85674"/>
+            <a:ext cx="7227984" cy="351337"/>
           </a:xfrm>
           <a:prstGeom prst="rect">
             <a:avLst/>
@@ -19880,128 +19858,57 @@
           </a:ln>
         </p:spPr>
         <p:txBody>
-          <a:bodyPr spcFirstLastPara="1" wrap="square" lIns="90000" tIns="45000" rIns="90000" bIns="45000" anchor="ctr" anchorCtr="0">
-            <a:noAutofit/>
-          </a:bodyPr>
+          <a:bodyPr lIns="89993" tIns="44996" rIns="89993" bIns="44996" anchor="t"/>
+          <a:p>
+            <a:pPr>
+              <a:defRPr/>
+            </a:pPr>
+            <a:endParaRPr/>
+          </a:p>
+        </p:txBody>
+      </p:sp>
+      <p:sp>
+        <p:nvSpPr>
+          <p:cNvPr id="7" name="CustomShape 4" hidden="0"/>
+          <p:cNvSpPr>
+            <a:spLocks noGrp="1"/>
+          </p:cNvSpPr>
+          <p:nvPr isPhoto="0" userDrawn="0"/>
+        </p:nvSpPr>
+        <p:spPr bwMode="auto">
+          <a:xfrm flipH="0" flipV="0">
+            <a:off x="84234" y="6401836"/>
+            <a:ext cx="640399" cy="363937"/>
+          </a:xfrm>
+          <a:prstGeom prst="rect">
+            <a:avLst/>
+          </a:prstGeom>
+          <a:noFill/>
+          <a:ln>
+            <a:noFill/>
+          </a:ln>
+        </p:spPr>
+        <p:txBody>
+          <a:bodyPr lIns="89993" tIns="44996" rIns="89993" bIns="44996" anchor="ctr"/>
           <a:lstStyle/>
           <a:p>
-            <a:pPr marL="0" marR="0" lvl="0" indent="0" algn="r">
-              <a:lnSpc>
-                <a:spcPct val="100000"/>
-              </a:lnSpc>
-              <a:spcBef>
-                <a:spcPts val="0"/>
-              </a:spcBef>
-              <a:spcAft>
-                <a:spcPts val="0"/>
-              </a:spcAft>
-              <a:buNone/>
-              <a:defRPr/>
-            </a:pPr>
-            <a:fld id="{2F63DDD9-E976-E4FB-E9C9-08362D4B0A80}" type="slidenum">
-              <a:rPr lang="pt-BR" sz="1000" b="0" i="0" u="none" strike="noStrike" cap="none">
-                <a:solidFill>
-                  <a:srgbClr val="B2B2B2"/>
-                </a:solidFill>
-                <a:latin typeface="Verdana"/>
-                <a:ea typeface="Verdana"/>
-                <a:cs typeface="Verdana"/>
-              </a:rPr>
+            <a:pPr algn="r">
+              <a:lnSpc>
+                <a:spcPct val="100000"/>
+              </a:lnSpc>
+              <a:spcBef>
+                <a:spcPts val="0"/>
+              </a:spcBef>
+              <a:spcAft>
+                <a:spcPts val="0"/>
+              </a:spcAft>
+              <a:defRPr/>
+            </a:pPr>
+            <a:fld id="{5CC2A059-B141-45A7-B910-B096D6D06820}" type="slidenum">
+              <a:rPr/>
               <a:t/>
             </a:fld>
-            <a:endParaRPr sz="1000" b="0" i="0" u="none" strike="noStrike" cap="none">
-              <a:solidFill>
-                <a:schemeClr val="dk1"/>
-              </a:solidFill>
-              <a:latin typeface="Arial"/>
-              <a:ea typeface="Arial"/>
-              <a:cs typeface="Arial"/>
-            </a:endParaRPr>
-          </a:p>
-        </p:txBody>
-      </p:sp>
-      <p:sp>
-        <p:nvSpPr>
-          <p:cNvPr id="7" name="" hidden="0"/>
-          <p:cNvSpPr/>
-          <p:nvPr isPhoto="0" userDrawn="0"/>
-        </p:nvSpPr>
-        <p:spPr bwMode="auto">
-          <a:xfrm flipH="0" flipV="0">
-            <a:off x="724626" y="4088162"/>
-            <a:ext cx="8137413" cy="363423"/>
-          </a:xfrm>
-          <a:prstGeom prst="rect">
-            <a:avLst/>
-          </a:prstGeom>
-          <a:noFill/>
-        </p:spPr>
-        <p:txBody>
-          <a:bodyPr vertOverflow="overflow" horzOverflow="clip" vert="horz" wrap="square" lIns="91440" tIns="45720" rIns="91440" bIns="45720" numCol="1" spcCol="0" rtlCol="0" fromWordArt="0" anchor="t" anchorCtr="0" forceAA="0" upright="0" compatLnSpc="0">
-            <a:noAutofit/>
-          </a:bodyPr>
-          <a:p>
-            <a:pPr>
-              <a:defRPr/>
-            </a:pPr>
-            <a:r>
-              <a:rPr sz="2000" b="1"/>
-              <a:t>A chamada wait</a:t>
-            </a:r>
-            <a:endParaRPr sz="2000" b="1"/>
-          </a:p>
-          <a:p>
-            <a:pPr>
-              <a:defRPr/>
-            </a:pPr>
-            <a:endParaRPr sz="2000"/>
-          </a:p>
-          <a:p>
-            <a:pPr marL="305898" indent="-305898">
-              <a:buAutoNum type="arabicPeriod"/>
-              <a:defRPr/>
-            </a:pPr>
-            <a:r>
-              <a:rPr sz="2000" b="0"/>
-              <a:t>Criação de processos</a:t>
-            </a:r>
-            <a:endParaRPr sz="2000" b="0"/>
-          </a:p>
-          <a:p>
-            <a:pPr marL="305898" indent="-305898">
-              <a:buAutoNum type="arabicPeriod"/>
-              <a:defRPr/>
-            </a:pPr>
-            <a:r>
-              <a:rPr sz="2000" b="0"/>
-              <a:t>Identificação de término de processos</a:t>
-            </a:r>
-            <a:endParaRPr sz="2000" b="0"/>
-          </a:p>
-          <a:p>
-            <a:pPr marL="305898" indent="-305898">
-              <a:buAutoNum type="arabicPeriod"/>
-              <a:defRPr/>
-            </a:pPr>
-            <a:r>
-              <a:rPr sz="2000" b="0"/>
-              <a:t>Utilização do manual para dúvidas sobre as chamadas</a:t>
-            </a:r>
-            <a:endParaRPr sz="2000" b="0"/>
-          </a:p>
-          <a:p>
-            <a:pPr marL="305898" indent="-305898">
-              <a:buAutoNum type="arabicPeriod"/>
-              <a:defRPr/>
-            </a:pPr>
-            <a:endParaRPr sz="2000" b="0"/>
-          </a:p>
-          <a:p>
-            <a:pPr marL="305898" indent="-305898">
-              <a:buAutoNum type="arabicPeriod"/>
-              <a:defRPr/>
-            </a:pPr>
-            <a:endParaRPr sz="2000" b="0"/>
+            <a:endParaRPr/>
           </a:p>
         </p:txBody>
       </p:sp>
@@ -20023,7 +19930,7 @@
 
 <file path=ppt/slides/slide36.xml><?xml version="1.0" encoding="utf-8"?>
 <p:sld xmlns:a="http://schemas.openxmlformats.org/drawingml/2006/main" xmlns:r="http://schemas.openxmlformats.org/officeDocument/2006/relationships" xmlns:p="http://schemas.openxmlformats.org/presentationml/2006/main" xmlns:m="http://schemas.openxmlformats.org/officeDocument/2006/math" xmlns:w="http://schemas.openxmlformats.org/wordprocessingml/2006/main" showMasterPhAnim="0" show="1">
-  <p:cSld name="page34">
+  <p:cSld name="">
     <p:spTree>
       <p:nvGrpSpPr>
         <p:cNvPr id="1" name="" hidden="0"/>
@@ -20040,16 +19947,14 @@
       </p:grpSpPr>
       <p:sp>
         <p:nvSpPr>
-          <p:cNvPr id="4" name="CustomShape 1" hidden="0"/>
-          <p:cNvSpPr>
-            <a:spLocks noGrp="1"/>
-          </p:cNvSpPr>
-          <p:nvPr isPhoto="0" userDrawn="0"/>
-        </p:nvSpPr>
-        <p:spPr bwMode="auto">
-          <a:xfrm flipH="0" flipV="0">
-            <a:off x="457171" y="284742"/>
-            <a:ext cx="8228001" cy="1114489"/>
+          <p:cNvPr id="4" name="Google Shape;347;p64" hidden="0"/>
+          <p:cNvSpPr/>
+          <p:nvPr isPhoto="0" userDrawn="0"/>
+        </p:nvSpPr>
+        <p:spPr bwMode="auto">
+          <a:xfrm>
+            <a:off x="457170" y="2920468"/>
+            <a:ext cx="8228000" cy="618080"/>
           </a:xfrm>
           <a:prstGeom prst="rect">
             <a:avLst/>
@@ -20060,48 +19965,56 @@
           </a:ln>
         </p:spPr>
         <p:txBody>
-          <a:bodyPr lIns="89993" tIns="44996" rIns="89993" bIns="44996" anchor="t"/>
+          <a:bodyPr spcFirstLastPara="1" wrap="square" lIns="90000" tIns="45000" rIns="90000" bIns="45000" anchor="t" anchorCtr="0">
+            <a:noAutofit/>
+          </a:bodyPr>
           <a:lstStyle/>
           <a:p>
-            <a:pPr algn="l">
-              <a:lnSpc>
-                <a:spcPct val="100000"/>
-              </a:lnSpc>
-              <a:spcBef>
-                <a:spcPts val="0"/>
-              </a:spcBef>
-              <a:spcAft>
-                <a:spcPts val="0"/>
-              </a:spcAft>
-              <a:defRPr/>
-            </a:pPr>
-            <a:r>
-              <a:rPr sz="3200" u="none">
+            <a:pPr marL="0" marR="0" lvl="0" indent="0" algn="ctr">
+              <a:lnSpc>
+                <a:spcPct val="100000"/>
+              </a:lnSpc>
+              <a:spcBef>
+                <a:spcPts val="0"/>
+              </a:spcBef>
+              <a:spcAft>
+                <a:spcPts val="0"/>
+              </a:spcAft>
+              <a:buNone/>
+              <a:defRPr/>
+            </a:pPr>
+            <a:r>
+              <a:rPr lang="pt-BR" sz="3600" b="1" i="0" u="none" strike="noStrike" cap="none">
                 <a:solidFill>
                   <a:srgbClr val="C00026"/>
                 </a:solidFill>
                 <a:latin typeface="Verdana"/>
                 <a:ea typeface="Verdana"/>
-                <a:cs typeface="DejaVu Sans"/>
-              </a:rPr>
-              <a:t>Como executar novos programas?</a:t>
-            </a:r>
-            <a:endParaRPr/>
-          </a:p>
-        </p:txBody>
-      </p:sp>
-      <p:sp>
-        <p:nvSpPr>
-          <p:cNvPr id="5" name="CustomShape 2" hidden="0"/>
-          <p:cNvSpPr>
-            <a:spLocks noGrp="1"/>
-          </p:cNvSpPr>
-          <p:nvPr isPhoto="0" userDrawn="0"/>
-        </p:nvSpPr>
-        <p:spPr bwMode="auto">
-          <a:xfrm flipH="0" flipV="0">
-            <a:off x="333339" y="1629977"/>
-            <a:ext cx="8027854" cy="4722902"/>
+                <a:cs typeface="Verdana"/>
+              </a:rPr>
+              <a:t>Atividade prática</a:t>
+            </a:r>
+            <a:endParaRPr sz="3600" b="1" i="0" u="none" strike="noStrike" cap="none">
+              <a:solidFill>
+                <a:schemeClr val="dk1"/>
+              </a:solidFill>
+              <a:latin typeface="Arial"/>
+              <a:ea typeface="Arial"/>
+              <a:cs typeface="Arial"/>
+            </a:endParaRPr>
+          </a:p>
+        </p:txBody>
+      </p:sp>
+      <p:sp>
+        <p:nvSpPr>
+          <p:cNvPr id="5" name="Google Shape;348;p64" hidden="0"/>
+          <p:cNvSpPr/>
+          <p:nvPr isPhoto="0" userDrawn="0"/>
+        </p:nvSpPr>
+        <p:spPr bwMode="auto">
+          <a:xfrm>
+            <a:off x="161987" y="85673"/>
+            <a:ext cx="7227983" cy="351336"/>
           </a:xfrm>
           <a:prstGeom prst="rect">
             <a:avLst/>
@@ -20112,158 +20025,35 @@
           </a:ln>
         </p:spPr>
         <p:txBody>
-          <a:bodyPr lIns="89993" tIns="44996" rIns="89993" bIns="44996" anchor="t"/>
+          <a:bodyPr spcFirstLastPara="1" wrap="square" lIns="91422" tIns="91422" rIns="91422" bIns="91422" anchor="ctr" anchorCtr="0">
+            <a:noAutofit/>
+          </a:bodyPr>
           <a:lstStyle/>
           <a:p>
-            <a:pPr marL="0" marR="0" lvl="0" indent="215986" algn="l">
-              <a:lnSpc>
-                <a:spcPct val="100000"/>
-              </a:lnSpc>
-              <a:spcBef>
-                <a:spcPts val="1977"/>
-              </a:spcBef>
-              <a:spcAft>
-                <a:spcPts val="1417"/>
-              </a:spcAft>
-              <a:buSzPct val="45000"/>
-              <a:buFont typeface="StarSymbol"/>
-              <a:buChar char="●"/>
-              <a:defRPr/>
-            </a:pPr>
-            <a:r>
-              <a:rPr sz="1800" u="none">
-                <a:latin typeface="Liberation Sans"/>
-                <a:ea typeface="Noto Sans CJK SC Regular"/>
-                <a:cs typeface="DejaVu Sans"/>
-              </a:rPr>
-              <a:t>fork só permite a criação de clones de um processo!</a:t>
-            </a:r>
-            <a:endParaRPr/>
-          </a:p>
-          <a:p>
-            <a:pPr marL="0" marR="0" lvl="0" indent="215986" algn="l">
-              <a:lnSpc>
-                <a:spcPct val="100000"/>
-              </a:lnSpc>
-              <a:spcBef>
-                <a:spcPts val="1977"/>
-              </a:spcBef>
-              <a:spcAft>
-                <a:spcPts val="1417"/>
-              </a:spcAft>
-              <a:buSzPct val="45000"/>
-              <a:buFont typeface="StarSymbol"/>
-              <a:buChar char="●"/>
-              <a:defRPr/>
-            </a:pPr>
-            <a:r>
-              <a:rPr sz="1800" u="none">
-                <a:latin typeface="Liberation Sans"/>
-                <a:ea typeface="Noto Sans CJK SC Regular"/>
-                <a:cs typeface="DejaVu Sans"/>
-              </a:rPr>
-              <a:t>Família de funções </a:t>
-            </a:r>
-            <a:r>
-              <a:rPr sz="1800" u="none">
-                <a:latin typeface="DejaVu Sans Mono"/>
-                <a:ea typeface="Noto Sans CJK SC Regular"/>
-                <a:cs typeface="DejaVu Sans"/>
-              </a:rPr>
-              <a:t>exec</a:t>
-            </a:r>
-            <a:r>
-              <a:rPr sz="1800" u="none">
-                <a:latin typeface="Liberation Sans"/>
-                <a:ea typeface="Noto Sans CJK SC Regular"/>
-                <a:cs typeface="DejaVu Sans"/>
-              </a:rPr>
-              <a:t> permite o carregamento de um programa do disco</a:t>
-            </a:r>
-            <a:endParaRPr/>
-          </a:p>
-          <a:p>
-            <a:pPr marL="0" marR="0" lvl="0" indent="215986" algn="l">
-              <a:lnSpc>
-                <a:spcPct val="100000"/>
-              </a:lnSpc>
-              <a:spcBef>
-                <a:spcPts val="1977"/>
-              </a:spcBef>
-              <a:spcAft>
-                <a:spcPts val="1417"/>
-              </a:spcAft>
-              <a:buSzPct val="45000"/>
-              <a:buFont typeface="StarSymbol"/>
-              <a:buChar char="●"/>
-              <a:defRPr/>
-            </a:pPr>
-            <a:r>
-              <a:rPr sz="1800" u="none">
-                <a:latin typeface="Liberation Sans"/>
-                <a:ea typeface="Noto Sans CJK SC Regular"/>
-                <a:cs typeface="DejaVu Sans"/>
-              </a:rPr>
-              <a:t>É permitido setar as variáveis de ambiente do novo programa e seus argumentos.</a:t>
-            </a:r>
-            <a:endParaRPr/>
-          </a:p>
-          <a:p>
-            <a:pPr marL="0" marR="0" lvl="0" indent="215986" algn="l">
-              <a:lnSpc>
-                <a:spcPct val="100000"/>
-              </a:lnSpc>
-              <a:spcBef>
-                <a:spcPts val="1977"/>
-              </a:spcBef>
-              <a:spcAft>
-                <a:spcPts val="1417"/>
-              </a:spcAft>
-              <a:buSzPct val="45000"/>
-              <a:buFont typeface="StarSymbol"/>
-              <a:buChar char="●"/>
-              <a:defRPr/>
-            </a:pPr>
-            <a:r>
-              <a:rPr sz="1800" u="none">
-                <a:latin typeface="Liberation Sans"/>
-                <a:ea typeface="Noto Sans CJK SC Regular"/>
-                <a:cs typeface="DejaVu Sans"/>
-              </a:rPr>
-              <a:t>Funções da família </a:t>
-            </a:r>
-            <a:r>
-              <a:rPr sz="1800" u="none">
-                <a:latin typeface="DejaVu Sans Mono"/>
-                <a:ea typeface="Noto Sans CJK SC Regular"/>
-                <a:cs typeface="DejaVu Sans"/>
-              </a:rPr>
-              <a:t>exec</a:t>
-            </a:r>
-            <a:r>
-              <a:rPr sz="1800" u="none">
-                <a:latin typeface="Liberation Sans"/>
-                <a:ea typeface="Noto Sans CJK SC Regular"/>
-                <a:cs typeface="DejaVu Sans"/>
-              </a:rPr>
-              <a:t> nunca retornam: o programa atual é destruído durante o carregamento do novo programa</a:t>
-            </a:r>
-            <a:endParaRPr/>
-          </a:p>
-        </p:txBody>
-      </p:sp>
-      <p:sp>
-        <p:nvSpPr>
-          <p:cNvPr id="6" name="CustomShape 3" hidden="0"/>
-          <p:cNvSpPr>
-            <a:spLocks noGrp="1"/>
-          </p:cNvSpPr>
-          <p:nvPr isPhoto="0" userDrawn="0"/>
-        </p:nvSpPr>
-        <p:spPr bwMode="auto">
-          <a:xfrm flipH="0" flipV="0">
-            <a:off x="161989" y="85674"/>
-            <a:ext cx="7227984" cy="351337"/>
+            <a:pPr marL="0" lvl="0" indent="0" algn="l">
+              <a:spcBef>
+                <a:spcPts val="0"/>
+              </a:spcBef>
+              <a:spcAft>
+                <a:spcPts val="0"/>
+              </a:spcAft>
+              <a:buNone/>
+              <a:defRPr/>
+            </a:pPr>
+            <a:endParaRPr/>
+          </a:p>
+        </p:txBody>
+      </p:sp>
+      <p:sp>
+        <p:nvSpPr>
+          <p:cNvPr id="6" name="Google Shape;349;p64" hidden="0"/>
+          <p:cNvSpPr/>
+          <p:nvPr isPhoto="0" userDrawn="0"/>
+        </p:nvSpPr>
+        <p:spPr bwMode="auto">
+          <a:xfrm>
+            <a:off x="84233" y="6401835"/>
+            <a:ext cx="640398" cy="363936"/>
           </a:xfrm>
           <a:prstGeom prst="rect">
             <a:avLst/>
@@ -20274,57 +20064,128 @@
           </a:ln>
         </p:spPr>
         <p:txBody>
-          <a:bodyPr lIns="89993" tIns="44996" rIns="89993" bIns="44996" anchor="t"/>
-          <a:p>
-            <a:pPr>
-              <a:defRPr/>
-            </a:pPr>
-            <a:endParaRPr/>
-          </a:p>
-        </p:txBody>
-      </p:sp>
-      <p:sp>
-        <p:nvSpPr>
-          <p:cNvPr id="7" name="CustomShape 4" hidden="0"/>
-          <p:cNvSpPr>
-            <a:spLocks noGrp="1"/>
-          </p:cNvSpPr>
-          <p:nvPr isPhoto="0" userDrawn="0"/>
-        </p:nvSpPr>
-        <p:spPr bwMode="auto">
-          <a:xfrm flipH="0" flipV="0">
-            <a:off x="84234" y="6401836"/>
-            <a:ext cx="640399" cy="363937"/>
-          </a:xfrm>
-          <a:prstGeom prst="rect">
-            <a:avLst/>
-          </a:prstGeom>
-          <a:noFill/>
-          <a:ln>
-            <a:noFill/>
-          </a:ln>
-        </p:spPr>
-        <p:txBody>
-          <a:bodyPr lIns="89993" tIns="44996" rIns="89993" bIns="44996" anchor="ctr"/>
+          <a:bodyPr spcFirstLastPara="1" wrap="square" lIns="90000" tIns="45000" rIns="90000" bIns="45000" anchor="ctr" anchorCtr="0">
+            <a:noAutofit/>
+          </a:bodyPr>
           <a:lstStyle/>
           <a:p>
-            <a:pPr algn="r">
-              <a:lnSpc>
-                <a:spcPct val="100000"/>
-              </a:lnSpc>
-              <a:spcBef>
-                <a:spcPts val="0"/>
-              </a:spcBef>
-              <a:spcAft>
-                <a:spcPts val="0"/>
-              </a:spcAft>
-              <a:defRPr/>
-            </a:pPr>
-            <a:fld id="{5CC2A059-B141-45A7-B910-B096D6D06820}" type="slidenum">
-              <a:rPr/>
+            <a:pPr marL="0" marR="0" lvl="0" indent="0" algn="r">
+              <a:lnSpc>
+                <a:spcPct val="100000"/>
+              </a:lnSpc>
+              <a:spcBef>
+                <a:spcPts val="0"/>
+              </a:spcBef>
+              <a:spcAft>
+                <a:spcPts val="0"/>
+              </a:spcAft>
+              <a:buNone/>
+              <a:defRPr/>
+            </a:pPr>
+            <a:fld id="{2F63DDD9-E976-E4FB-E9C9-08362D4B0A80}" type="slidenum">
+              <a:rPr lang="pt-BR" sz="1000" b="0" i="0" u="none" strike="noStrike" cap="none">
+                <a:solidFill>
+                  <a:srgbClr val="B2B2B2"/>
+                </a:solidFill>
+                <a:latin typeface="Verdana"/>
+                <a:ea typeface="Verdana"/>
+                <a:cs typeface="Verdana"/>
+              </a:rPr>
               <a:t/>
             </a:fld>
-            <a:endParaRPr/>
+            <a:endParaRPr sz="1000" b="0" i="0" u="none" strike="noStrike" cap="none">
+              <a:solidFill>
+                <a:schemeClr val="dk1"/>
+              </a:solidFill>
+              <a:latin typeface="Arial"/>
+              <a:ea typeface="Arial"/>
+              <a:cs typeface="Arial"/>
+            </a:endParaRPr>
+          </a:p>
+        </p:txBody>
+      </p:sp>
+      <p:sp>
+        <p:nvSpPr>
+          <p:cNvPr id="7" name="" hidden="0"/>
+          <p:cNvSpPr/>
+          <p:nvPr isPhoto="0" userDrawn="0"/>
+        </p:nvSpPr>
+        <p:spPr bwMode="auto">
+          <a:xfrm flipH="0" flipV="0">
+            <a:off x="724626" y="4088162"/>
+            <a:ext cx="8137413" cy="363423"/>
+          </a:xfrm>
+          <a:prstGeom prst="rect">
+            <a:avLst/>
+          </a:prstGeom>
+          <a:noFill/>
+        </p:spPr>
+        <p:txBody>
+          <a:bodyPr vertOverflow="overflow" horzOverflow="clip" vert="horz" wrap="square" lIns="91440" tIns="45720" rIns="91440" bIns="45720" numCol="1" spcCol="0" rtlCol="0" fromWordArt="0" anchor="t" anchorCtr="0" forceAA="0" upright="0" compatLnSpc="0">
+            <a:noAutofit/>
+          </a:bodyPr>
+          <a:p>
+            <a:pPr>
+              <a:defRPr/>
+            </a:pPr>
+            <a:r>
+              <a:rPr sz="2000" b="1"/>
+              <a:t>A chamada wait</a:t>
+            </a:r>
+            <a:endParaRPr sz="2000" b="1"/>
+          </a:p>
+          <a:p>
+            <a:pPr>
+              <a:defRPr/>
+            </a:pPr>
+            <a:endParaRPr sz="2000"/>
+          </a:p>
+          <a:p>
+            <a:pPr marL="305898" indent="-305898">
+              <a:buAutoNum type="arabicPeriod"/>
+              <a:defRPr/>
+            </a:pPr>
+            <a:r>
+              <a:rPr sz="2000" b="0"/>
+              <a:t>Criação de processos</a:t>
+            </a:r>
+            <a:endParaRPr sz="2000" b="0"/>
+          </a:p>
+          <a:p>
+            <a:pPr marL="305898" indent="-305898">
+              <a:buAutoNum type="arabicPeriod"/>
+              <a:defRPr/>
+            </a:pPr>
+            <a:r>
+              <a:rPr sz="2000" b="0"/>
+              <a:t>Identificação de término de processos</a:t>
+            </a:r>
+            <a:endParaRPr sz="2000" b="0"/>
+          </a:p>
+          <a:p>
+            <a:pPr marL="305898" indent="-305898">
+              <a:buAutoNum type="arabicPeriod"/>
+              <a:defRPr/>
+            </a:pPr>
+            <a:r>
+              <a:rPr sz="2000" b="0"/>
+              <a:t>Utilização do manual para dúvidas sobre as chamadas</a:t>
+            </a:r>
+            <a:endParaRPr sz="2000" b="0"/>
+          </a:p>
+          <a:p>
+            <a:pPr marL="305898" indent="-305898">
+              <a:buAutoNum type="arabicPeriod"/>
+              <a:defRPr/>
+            </a:pPr>
+            <a:endParaRPr sz="2000" b="0"/>
+          </a:p>
+          <a:p>
+            <a:pPr marL="305898" indent="-305898">
+              <a:buAutoNum type="arabicPeriod"/>
+              <a:defRPr/>
+            </a:pPr>
+            <a:endParaRPr sz="2000" b="0"/>
           </a:p>
         </p:txBody>
       </p:sp>
@@ -20345,6 +20206,522 @@
 </file>
 
 <file path=ppt/slides/slide37.xml><?xml version="1.0" encoding="utf-8"?>
+<p:sld xmlns:a="http://schemas.openxmlformats.org/drawingml/2006/main" xmlns:r="http://schemas.openxmlformats.org/officeDocument/2006/relationships" xmlns:p="http://schemas.openxmlformats.org/presentationml/2006/main" xmlns:m="http://schemas.openxmlformats.org/officeDocument/2006/math" xmlns:w="http://schemas.openxmlformats.org/wordprocessingml/2006/main" showMasterPhAnim="0" show="1">
+  <p:cSld name="">
+    <p:spTree>
+      <p:nvGrpSpPr>
+        <p:cNvPr id="1" name="" hidden="0"/>
+        <p:cNvGrpSpPr/>
+        <p:nvPr isPhoto="0" userDrawn="0"/>
+      </p:nvGrpSpPr>
+      <p:grpSpPr bwMode="auto">
+        <a:xfrm>
+          <a:off x="0" y="0"/>
+          <a:ext cx="0" cy="0"/>
+          <a:chOff x="0" y="0"/>
+          <a:chExt cx="0" cy="0"/>
+        </a:xfrm>
+      </p:grpSpPr>
+      <p:sp>
+        <p:nvSpPr>
+          <p:cNvPr id="4" name="CustomShape 1" hidden="0"/>
+          <p:cNvSpPr/>
+          <p:nvPr isPhoto="0" userDrawn="0"/>
+        </p:nvSpPr>
+        <p:spPr bwMode="auto">
+          <a:xfrm>
+            <a:off x="457171" y="781150"/>
+            <a:ext cx="8228001" cy="618080"/>
+          </a:xfrm>
+          <a:prstGeom prst="rect">
+            <a:avLst/>
+          </a:prstGeom>
+          <a:noFill/>
+          <a:ln>
+            <a:noFill/>
+          </a:ln>
+        </p:spPr>
+        <p:style>
+          <a:lnRef idx="0"/>
+          <a:fillRef idx="0"/>
+          <a:effectRef idx="0"/>
+          <a:fontRef idx="minor"/>
+        </p:style>
+        <p:txBody>
+          <a:bodyPr lIns="90000" tIns="45000" rIns="90000" bIns="45000"/>
+          <a:p>
+            <a:pPr>
+              <a:lnSpc>
+                <a:spcPct val="100000"/>
+              </a:lnSpc>
+              <a:defRPr/>
+            </a:pPr>
+            <a:r>
+              <a:rPr lang="pt-BR" sz="3200" b="0" strike="noStrike" spc="0">
+                <a:solidFill>
+                  <a:srgbClr val="C00026"/>
+                </a:solidFill>
+                <a:latin typeface="Verdana"/>
+                <a:ea typeface="Verdana"/>
+              </a:rPr>
+              <a:t>Parentesco de processos – II</a:t>
+            </a:r>
+            <a:endParaRPr lang="pt-BR" sz="3200" b="0" strike="noStrike" spc="0">
+              <a:latin typeface="Arial"/>
+            </a:endParaRPr>
+          </a:p>
+          <a:p>
+            <a:pPr>
+              <a:lnSpc>
+                <a:spcPct val="100000"/>
+              </a:lnSpc>
+              <a:defRPr/>
+            </a:pPr>
+            <a:endParaRPr lang="pt-BR" sz="3200" b="0" strike="noStrike" spc="0">
+              <a:latin typeface="Arial"/>
+            </a:endParaRPr>
+          </a:p>
+        </p:txBody>
+      </p:sp>
+      <p:sp>
+        <p:nvSpPr>
+          <p:cNvPr id="5" name="CustomShape 2" hidden="0"/>
+          <p:cNvSpPr/>
+          <p:nvPr isPhoto="0" userDrawn="0"/>
+        </p:nvSpPr>
+        <p:spPr bwMode="auto">
+          <a:xfrm>
+            <a:off x="161989" y="85674"/>
+            <a:ext cx="7227984" cy="351337"/>
+          </a:xfrm>
+          <a:prstGeom prst="rect">
+            <a:avLst/>
+          </a:prstGeom>
+          <a:noFill/>
+          <a:ln>
+            <a:noFill/>
+          </a:ln>
+        </p:spPr>
+        <p:style>
+          <a:lnRef idx="0"/>
+          <a:fillRef idx="0"/>
+          <a:effectRef idx="0"/>
+          <a:fontRef idx="minor"/>
+        </p:style>
+      </p:sp>
+      <p:sp>
+        <p:nvSpPr>
+          <p:cNvPr id="6" name="CustomShape 3" hidden="0"/>
+          <p:cNvSpPr/>
+          <p:nvPr isPhoto="0" userDrawn="0"/>
+        </p:nvSpPr>
+        <p:spPr bwMode="auto">
+          <a:xfrm>
+            <a:off x="84234" y="6401836"/>
+            <a:ext cx="640399" cy="363936"/>
+          </a:xfrm>
+          <a:prstGeom prst="rect">
+            <a:avLst/>
+          </a:prstGeom>
+          <a:noFill/>
+          <a:ln>
+            <a:noFill/>
+          </a:ln>
+        </p:spPr>
+        <p:style>
+          <a:lnRef idx="0"/>
+          <a:fillRef idx="0"/>
+          <a:effectRef idx="0"/>
+          <a:fontRef idx="minor"/>
+        </p:style>
+        <p:txBody>
+          <a:bodyPr lIns="90000" tIns="45000" rIns="90000" bIns="45000" anchor="ctr"/>
+          <a:p>
+            <a:pPr algn="r">
+              <a:lnSpc>
+                <a:spcPct val="100000"/>
+              </a:lnSpc>
+              <a:defRPr/>
+            </a:pPr>
+            <a:fld id="{277A8D0F-837F-51EF-45E3-C373CA39B71D}" type="slidenum">
+              <a:rPr lang="pt-BR" sz="1000" b="0" strike="noStrike" spc="0">
+                <a:solidFill>
+                  <a:srgbClr val="B2B2B2"/>
+                </a:solidFill>
+                <a:latin typeface="Verdana"/>
+                <a:ea typeface="Verdana"/>
+              </a:rPr>
+              <a:t/>
+            </a:fld>
+            <a:endParaRPr lang="pt-BR" sz="1000" b="0" strike="noStrike" spc="0">
+              <a:latin typeface="Arial"/>
+            </a:endParaRPr>
+          </a:p>
+        </p:txBody>
+      </p:sp>
+      <p:pic>
+        <p:nvPicPr>
+          <p:cNvPr id="7" name="" descr="" hidden="0"/>
+          <p:cNvPicPr/>
+          <p:nvPr isPhoto="0" userDrawn="0"/>
+        </p:nvPicPr>
+        <p:blipFill>
+          <a:blip r:embed="rId2"/>
+          <a:stretch/>
+        </p:blipFill>
+        <p:spPr bwMode="auto">
+          <a:xfrm>
+            <a:off x="1664534" y="1727890"/>
+            <a:ext cx="5738398" cy="4679705"/>
+          </a:xfrm>
+          <a:prstGeom prst="rect">
+            <a:avLst/>
+          </a:prstGeom>
+          <a:ln>
+            <a:noFill/>
+          </a:ln>
+        </p:spPr>
+      </p:pic>
+    </p:spTree>
+  </p:cSld>
+  <p:clrMapOvr>
+    <a:masterClrMapping/>
+  </p:clrMapOvr>
+  <mc:AlternateContent xmlns:mc="http://schemas.openxmlformats.org/markup-compatibility/2006">
+    <mc:Choice xmlns:p14="http://schemas.microsoft.com/office/powerpoint/2010/main" Requires="p14">
+      <p:transition p14:dur="2000" advClick="1"/>
+    </mc:Choice>
+    <mc:Fallback>
+      <p:transition advClick="1"/>
+    </mc:Fallback>
+  </mc:AlternateContent>
+</p:sld>
+</file>
+
+<file path=ppt/slides/slide38.xml><?xml version="1.0" encoding="utf-8"?>
+<p:sld xmlns:a="http://schemas.openxmlformats.org/drawingml/2006/main" xmlns:r="http://schemas.openxmlformats.org/officeDocument/2006/relationships" xmlns:p="http://schemas.openxmlformats.org/presentationml/2006/main" xmlns:m="http://schemas.openxmlformats.org/officeDocument/2006/math" xmlns:w="http://schemas.openxmlformats.org/wordprocessingml/2006/main" showMasterPhAnim="0" show="1">
+  <p:cSld name="page34">
+    <p:spTree>
+      <p:nvGrpSpPr>
+        <p:cNvPr id="1" name="" hidden="0"/>
+        <p:cNvGrpSpPr/>
+        <p:nvPr isPhoto="0" userDrawn="0"/>
+      </p:nvGrpSpPr>
+      <p:grpSpPr bwMode="auto">
+        <a:xfrm>
+          <a:off x="0" y="0"/>
+          <a:ext cx="0" cy="0"/>
+          <a:chOff x="0" y="0"/>
+          <a:chExt cx="0" cy="0"/>
+        </a:xfrm>
+      </p:grpSpPr>
+      <p:sp>
+        <p:nvSpPr>
+          <p:cNvPr id="4" name="CustomShape 1" hidden="0"/>
+          <p:cNvSpPr>
+            <a:spLocks noGrp="1"/>
+          </p:cNvSpPr>
+          <p:nvPr isPhoto="0" userDrawn="0"/>
+        </p:nvSpPr>
+        <p:spPr bwMode="auto">
+          <a:xfrm flipH="0" flipV="0">
+            <a:off x="457171" y="284742"/>
+            <a:ext cx="8228001" cy="1114489"/>
+          </a:xfrm>
+          <a:prstGeom prst="rect">
+            <a:avLst/>
+          </a:prstGeom>
+          <a:noFill/>
+          <a:ln>
+            <a:noFill/>
+          </a:ln>
+        </p:spPr>
+        <p:txBody>
+          <a:bodyPr lIns="89993" tIns="44996" rIns="89993" bIns="44996" anchor="t"/>
+          <a:lstStyle/>
+          <a:p>
+            <a:pPr algn="l">
+              <a:lnSpc>
+                <a:spcPct val="100000"/>
+              </a:lnSpc>
+              <a:spcBef>
+                <a:spcPts val="0"/>
+              </a:spcBef>
+              <a:spcAft>
+                <a:spcPts val="0"/>
+              </a:spcAft>
+              <a:defRPr/>
+            </a:pPr>
+            <a:r>
+              <a:rPr sz="3200" u="none">
+                <a:solidFill>
+                  <a:srgbClr val="C00026"/>
+                </a:solidFill>
+                <a:latin typeface="Verdana"/>
+                <a:ea typeface="Verdana"/>
+                <a:cs typeface="DejaVu Sans"/>
+              </a:rPr>
+              <a:t>Como executar novos programas?</a:t>
+            </a:r>
+            <a:endParaRPr/>
+          </a:p>
+        </p:txBody>
+      </p:sp>
+      <p:sp>
+        <p:nvSpPr>
+          <p:cNvPr id="5" name="CustomShape 2" hidden="0"/>
+          <p:cNvSpPr>
+            <a:spLocks noGrp="1"/>
+          </p:cNvSpPr>
+          <p:nvPr isPhoto="0" userDrawn="0"/>
+        </p:nvSpPr>
+        <p:spPr bwMode="auto">
+          <a:xfrm flipH="0" flipV="0">
+            <a:off x="333339" y="1629977"/>
+            <a:ext cx="8027854" cy="4722902"/>
+          </a:xfrm>
+          <a:prstGeom prst="rect">
+            <a:avLst/>
+          </a:prstGeom>
+          <a:noFill/>
+          <a:ln>
+            <a:noFill/>
+          </a:ln>
+        </p:spPr>
+        <p:txBody>
+          <a:bodyPr lIns="89993" tIns="44996" rIns="89993" bIns="44996" anchor="t"/>
+          <a:lstStyle/>
+          <a:p>
+            <a:pPr marL="0" marR="0" lvl="0" indent="215986" algn="l">
+              <a:lnSpc>
+                <a:spcPct val="100000"/>
+              </a:lnSpc>
+              <a:spcBef>
+                <a:spcPts val="1977"/>
+              </a:spcBef>
+              <a:spcAft>
+                <a:spcPts val="1417"/>
+              </a:spcAft>
+              <a:buSzPct val="45000"/>
+              <a:buFont typeface="StarSymbol"/>
+              <a:buChar char="●"/>
+              <a:defRPr/>
+            </a:pPr>
+            <a:r>
+              <a:rPr sz="1800" u="none">
+                <a:latin typeface="Liberation Sans"/>
+                <a:ea typeface="Noto Sans CJK SC Regular"/>
+                <a:cs typeface="DejaVu Sans"/>
+              </a:rPr>
+              <a:t>fork só permite a criação de clones de um processo!</a:t>
+            </a:r>
+            <a:endParaRPr/>
+          </a:p>
+          <a:p>
+            <a:pPr marL="0" marR="0" lvl="0" indent="215986" algn="l">
+              <a:lnSpc>
+                <a:spcPct val="100000"/>
+              </a:lnSpc>
+              <a:spcBef>
+                <a:spcPts val="1977"/>
+              </a:spcBef>
+              <a:spcAft>
+                <a:spcPts val="1417"/>
+              </a:spcAft>
+              <a:buSzPct val="45000"/>
+              <a:buFont typeface="StarSymbol"/>
+              <a:buChar char="●"/>
+              <a:defRPr/>
+            </a:pPr>
+            <a:r>
+              <a:rPr sz="1800" u="none">
+                <a:latin typeface="Liberation Sans"/>
+                <a:ea typeface="Noto Sans CJK SC Regular"/>
+                <a:cs typeface="DejaVu Sans"/>
+              </a:rPr>
+              <a:t>Família de funções </a:t>
+            </a:r>
+            <a:r>
+              <a:rPr sz="1800" u="none">
+                <a:latin typeface="DejaVu Sans Mono"/>
+                <a:ea typeface="Noto Sans CJK SC Regular"/>
+                <a:cs typeface="DejaVu Sans"/>
+              </a:rPr>
+              <a:t>exec</a:t>
+            </a:r>
+            <a:r>
+              <a:rPr sz="1800" u="none">
+                <a:latin typeface="Liberation Sans"/>
+                <a:ea typeface="Noto Sans CJK SC Regular"/>
+                <a:cs typeface="DejaVu Sans"/>
+              </a:rPr>
+              <a:t> permite o carregamento de um programa do disco</a:t>
+            </a:r>
+            <a:endParaRPr/>
+          </a:p>
+          <a:p>
+            <a:pPr marL="0" marR="0" lvl="0" indent="215986" algn="l">
+              <a:lnSpc>
+                <a:spcPct val="100000"/>
+              </a:lnSpc>
+              <a:spcBef>
+                <a:spcPts val="1977"/>
+              </a:spcBef>
+              <a:spcAft>
+                <a:spcPts val="1417"/>
+              </a:spcAft>
+              <a:buSzPct val="45000"/>
+              <a:buFont typeface="StarSymbol"/>
+              <a:buChar char="●"/>
+              <a:defRPr/>
+            </a:pPr>
+            <a:r>
+              <a:rPr sz="1800" u="none">
+                <a:latin typeface="Liberation Sans"/>
+                <a:ea typeface="Noto Sans CJK SC Regular"/>
+                <a:cs typeface="DejaVu Sans"/>
+              </a:rPr>
+              <a:t>É permitido setar as variáveis de ambiente do novo programa e seus argumentos.</a:t>
+            </a:r>
+            <a:endParaRPr/>
+          </a:p>
+          <a:p>
+            <a:pPr marL="0" marR="0" lvl="0" indent="215986" algn="l">
+              <a:lnSpc>
+                <a:spcPct val="100000"/>
+              </a:lnSpc>
+              <a:spcBef>
+                <a:spcPts val="1977"/>
+              </a:spcBef>
+              <a:spcAft>
+                <a:spcPts val="1417"/>
+              </a:spcAft>
+              <a:buSzPct val="45000"/>
+              <a:buFont typeface="StarSymbol"/>
+              <a:buChar char="●"/>
+              <a:defRPr/>
+            </a:pPr>
+            <a:r>
+              <a:rPr sz="1800" u="none">
+                <a:latin typeface="Liberation Sans"/>
+                <a:ea typeface="Noto Sans CJK SC Regular"/>
+                <a:cs typeface="DejaVu Sans"/>
+              </a:rPr>
+              <a:t>Funções da família </a:t>
+            </a:r>
+            <a:r>
+              <a:rPr sz="1800" u="none">
+                <a:latin typeface="DejaVu Sans Mono"/>
+                <a:ea typeface="Noto Sans CJK SC Regular"/>
+                <a:cs typeface="DejaVu Sans"/>
+              </a:rPr>
+              <a:t>exec</a:t>
+            </a:r>
+            <a:r>
+              <a:rPr sz="1800" u="none">
+                <a:latin typeface="Liberation Sans"/>
+                <a:ea typeface="Noto Sans CJK SC Regular"/>
+                <a:cs typeface="DejaVu Sans"/>
+              </a:rPr>
+              <a:t> nunca retornam: o programa atual é destruído durante o carregamento do novo programa</a:t>
+            </a:r>
+            <a:endParaRPr/>
+          </a:p>
+        </p:txBody>
+      </p:sp>
+      <p:sp>
+        <p:nvSpPr>
+          <p:cNvPr id="6" name="CustomShape 3" hidden="0"/>
+          <p:cNvSpPr>
+            <a:spLocks noGrp="1"/>
+          </p:cNvSpPr>
+          <p:nvPr isPhoto="0" userDrawn="0"/>
+        </p:nvSpPr>
+        <p:spPr bwMode="auto">
+          <a:xfrm flipH="0" flipV="0">
+            <a:off x="161989" y="85674"/>
+            <a:ext cx="7227984" cy="351337"/>
+          </a:xfrm>
+          <a:prstGeom prst="rect">
+            <a:avLst/>
+          </a:prstGeom>
+          <a:noFill/>
+          <a:ln>
+            <a:noFill/>
+          </a:ln>
+        </p:spPr>
+        <p:txBody>
+          <a:bodyPr lIns="89993" tIns="44996" rIns="89993" bIns="44996" anchor="t"/>
+          <a:p>
+            <a:pPr>
+              <a:defRPr/>
+            </a:pPr>
+            <a:endParaRPr/>
+          </a:p>
+        </p:txBody>
+      </p:sp>
+      <p:sp>
+        <p:nvSpPr>
+          <p:cNvPr id="7" name="CustomShape 4" hidden="0"/>
+          <p:cNvSpPr>
+            <a:spLocks noGrp="1"/>
+          </p:cNvSpPr>
+          <p:nvPr isPhoto="0" userDrawn="0"/>
+        </p:nvSpPr>
+        <p:spPr bwMode="auto">
+          <a:xfrm flipH="0" flipV="0">
+            <a:off x="84234" y="6401836"/>
+            <a:ext cx="640399" cy="363937"/>
+          </a:xfrm>
+          <a:prstGeom prst="rect">
+            <a:avLst/>
+          </a:prstGeom>
+          <a:noFill/>
+          <a:ln>
+            <a:noFill/>
+          </a:ln>
+        </p:spPr>
+        <p:txBody>
+          <a:bodyPr lIns="89993" tIns="44996" rIns="89993" bIns="44996" anchor="ctr"/>
+          <a:lstStyle/>
+          <a:p>
+            <a:pPr algn="r">
+              <a:lnSpc>
+                <a:spcPct val="100000"/>
+              </a:lnSpc>
+              <a:spcBef>
+                <a:spcPts val="0"/>
+              </a:spcBef>
+              <a:spcAft>
+                <a:spcPts val="0"/>
+              </a:spcAft>
+              <a:defRPr/>
+            </a:pPr>
+            <a:fld id="{5CC2A059-B141-45A7-B910-B096D6D06820}" type="slidenum">
+              <a:rPr/>
+              <a:t/>
+            </a:fld>
+            <a:endParaRPr/>
+          </a:p>
+        </p:txBody>
+      </p:sp>
+    </p:spTree>
+  </p:cSld>
+  <p:clrMapOvr>
+    <a:masterClrMapping/>
+  </p:clrMapOvr>
+  <mc:AlternateContent xmlns:mc="http://schemas.openxmlformats.org/markup-compatibility/2006">
+    <mc:Choice xmlns:p14="http://schemas.microsoft.com/office/powerpoint/2010/main" Requires="p14">
+      <p:transition p14:dur="2000" advClick="1"/>
+    </mc:Choice>
+    <mc:Fallback>
+      <p:transition advClick="1"/>
+    </mc:Fallback>
+  </mc:AlternateContent>
+</p:sld>
+</file>
+
+<file path=ppt/slides/slide39.xml><?xml version="1.0" encoding="utf-8"?>
 <p:sld xmlns:a="http://schemas.openxmlformats.org/drawingml/2006/main" xmlns:r="http://schemas.openxmlformats.org/officeDocument/2006/relationships" xmlns:p="http://schemas.openxmlformats.org/presentationml/2006/main" xmlns:m="http://schemas.openxmlformats.org/officeDocument/2006/math" xmlns:w="http://schemas.openxmlformats.org/wordprocessingml/2006/main" showMasterPhAnim="0" show="1">
   <p:cSld name="page35">
     <p:bg>

</xml_diff>

<commit_message>
Deployed e8ce517 with MkDocs version: 1.1.2
</commit_message>
<xml_diff>
--- a/aulas/13-processos/slides.pptx
+++ b/aulas/13-processos/slides.pptx
@@ -1156,7 +1156,7 @@
                 <a:spcPct val="100000"/>
               </a:lnSpc>
               <a:spcBef>
-                <a:spcPts val="1978"/>
+                <a:spcPts val="1977"/>
               </a:spcBef>
               <a:spcAft>
                 <a:spcPts val="1416"/>
@@ -1185,7 +1185,7 @@
                 <a:spcPct val="100000"/>
               </a:lnSpc>
               <a:spcBef>
-                <a:spcPts val="1978"/>
+                <a:spcPts val="1977"/>
               </a:spcBef>
               <a:spcAft>
                 <a:spcPts val="1416"/>
@@ -1214,7 +1214,7 @@
                 <a:spcPct val="100000"/>
               </a:lnSpc>
               <a:spcBef>
-                <a:spcPts val="1978"/>
+                <a:spcPts val="1977"/>
               </a:spcBef>
               <a:spcAft>
                 <a:spcPts val="1416"/>
@@ -1243,7 +1243,7 @@
                 <a:spcPct val="100000"/>
               </a:lnSpc>
               <a:spcBef>
-                <a:spcPts val="1978"/>
+                <a:spcPts val="1977"/>
               </a:spcBef>
               <a:spcAft>
                 <a:spcPts val="1416"/>
@@ -1272,7 +1272,7 @@
                 <a:spcPct val="100000"/>
               </a:lnSpc>
               <a:spcBef>
-                <a:spcPts val="1978"/>
+                <a:spcPts val="1977"/>
               </a:spcBef>
               <a:spcAft>
                 <a:spcPts val="1416"/>
@@ -4032,7 +4032,7 @@
         </p:nvSpPr>
         <p:spPr bwMode="auto">
           <a:xfrm>
-            <a:off x="161988" y="85673"/>
+            <a:off x="161987" y="85673"/>
             <a:ext cx="7225823" cy="349177"/>
           </a:xfrm>
           <a:prstGeom prst="rect">
@@ -4172,7 +4172,7 @@
         <p:spPr bwMode="auto">
           <a:xfrm flipH="0" flipV="0">
             <a:off x="3450021" y="1979874"/>
-            <a:ext cx="1602271" cy="3819358"/>
+            <a:ext cx="1602270" cy="3819358"/>
           </a:xfrm>
           <a:prstGeom prst="rect">
             <a:avLst/>
@@ -4298,7 +4298,7 @@
         <p:spPr bwMode="auto">
           <a:xfrm flipH="1" flipV="1">
             <a:off x="5036801" y="4028865"/>
-            <a:ext cx="1287997" cy="13678"/>
+            <a:ext cx="1287997" cy="13677"/>
           </a:xfrm>
           <a:custGeom>
             <a:avLst/>
@@ -5802,7 +5802,7 @@
         </p:nvSpPr>
         <p:spPr bwMode="auto">
           <a:xfrm>
-            <a:off x="657318" y="2478083"/>
+            <a:off x="657317" y="2478083"/>
             <a:ext cx="8025334" cy="4694104"/>
           </a:xfrm>
           <a:prstGeom prst="rect">
@@ -17650,8 +17650,8 @@
         </p:nvSpPr>
         <p:spPr bwMode="auto">
           <a:xfrm>
-            <a:off x="657318" y="1485986"/>
-            <a:ext cx="8025694" cy="4720741"/>
+            <a:off x="657317" y="1485986"/>
+            <a:ext cx="8025693" cy="4720741"/>
           </a:xfrm>
           <a:prstGeom prst="rect">
             <a:avLst/>
@@ -17758,7 +17758,7 @@
         <p:spPr bwMode="auto">
           <a:xfrm>
             <a:off x="657678" y="1485986"/>
-            <a:ext cx="8025694" cy="4720741"/>
+            <a:ext cx="8025693" cy="4720741"/>
           </a:xfrm>
           <a:prstGeom prst="rect">
             <a:avLst/>
@@ -20904,8 +20904,8 @@
         </p:nvSpPr>
         <p:spPr bwMode="auto">
           <a:xfrm>
-            <a:off x="657318" y="1485986"/>
-            <a:ext cx="8025694" cy="4720741"/>
+            <a:off x="657317" y="1485986"/>
+            <a:ext cx="8025693" cy="4720741"/>
           </a:xfrm>
           <a:prstGeom prst="rect">
             <a:avLst/>
@@ -21012,7 +21012,7 @@
         <p:spPr bwMode="auto">
           <a:xfrm>
             <a:off x="657678" y="1485986"/>
-            <a:ext cx="8025694" cy="4720741"/>
+            <a:ext cx="8025693" cy="4720741"/>
           </a:xfrm>
           <a:prstGeom prst="rect">
             <a:avLst/>
@@ -21560,7 +21560,7 @@
         <p:spPr bwMode="auto">
           <a:xfrm flipH="0" flipV="0">
             <a:off x="3450022" y="1979875"/>
-            <a:ext cx="1602271" cy="3819359"/>
+            <a:ext cx="1602270" cy="3819359"/>
           </a:xfrm>
           <a:prstGeom prst="rect">
             <a:avLst/>
@@ -21686,7 +21686,7 @@
         <p:spPr bwMode="auto">
           <a:xfrm flipH="1" flipV="1">
             <a:off x="5036802" y="4028865"/>
-            <a:ext cx="1287998" cy="13678"/>
+            <a:ext cx="1287998" cy="13677"/>
           </a:xfrm>
           <a:custGeom>
             <a:avLst/>
@@ -22414,7 +22414,7 @@
         </p:nvSpPr>
         <p:spPr bwMode="auto">
           <a:xfrm flipH="0" flipV="0">
-            <a:off x="161988" y="85673"/>
+            <a:off x="161987" y="85673"/>
             <a:ext cx="7227983" cy="351336"/>
           </a:xfrm>
           <a:prstGeom prst="rect">
@@ -22516,7 +22516,7 @@
         </p:nvSpPr>
         <p:spPr bwMode="auto">
           <a:xfrm flipH="0" flipV="0">
-            <a:off x="1781886" y="6212127"/>
+            <a:off x="1781886" y="6212126"/>
             <a:ext cx="5210670" cy="363936"/>
           </a:xfrm>
           <a:prstGeom prst="rect">
@@ -22670,7 +22670,7 @@
         <p:txBody>
           <a:bodyPr lIns="90000" tIns="45000" rIns="90000" bIns="45000"/>
           <a:p>
-            <a:pPr marL="285840" indent="-283320" algn="ctr">
+            <a:pPr algn="ctr">
               <a:lnSpc>
                 <a:spcPct val="100000"/>
               </a:lnSpc>
@@ -22680,11 +22680,6 @@
               <a:spcAft>
                 <a:spcPts val="4534"/>
               </a:spcAft>
-              <a:buClr>
-                <a:srgbClr val="000000"/>
-              </a:buClr>
-              <a:buFont typeface="StarSymbol"/>
-              <a:buAutoNum type="arabicParenR"/>
               <a:defRPr/>
             </a:pPr>
             <a:r>
@@ -22947,7 +22942,7 @@
                 <a:spcPct val="100000"/>
               </a:lnSpc>
               <a:spcBef>
-                <a:spcPts val="1978"/>
+                <a:spcPts val="1977"/>
               </a:spcBef>
               <a:spcAft>
                 <a:spcPts val="1416"/>
@@ -22976,7 +22971,7 @@
                 <a:spcPct val="100000"/>
               </a:lnSpc>
               <a:spcBef>
-                <a:spcPts val="1978"/>
+                <a:spcPts val="1977"/>
               </a:spcBef>
               <a:spcAft>
                 <a:spcPts val="1416"/>
@@ -23375,7 +23370,7 @@
                 <a:spcPct val="100000"/>
               </a:lnSpc>
               <a:spcBef>
-                <a:spcPts val="1978"/>
+                <a:spcPts val="1977"/>
               </a:spcBef>
               <a:spcAft>
                 <a:spcPts val="1416"/>
@@ -23404,7 +23399,7 @@
                 <a:spcPct val="100000"/>
               </a:lnSpc>
               <a:spcBef>
-                <a:spcPts val="1978"/>
+                <a:spcPts val="1977"/>
               </a:spcBef>
               <a:spcAft>
                 <a:spcPts val="1416"/>
@@ -23443,7 +23438,7 @@
                 <a:spcPct val="100000"/>
               </a:lnSpc>
               <a:spcBef>
-                <a:spcPts val="1978"/>
+                <a:spcPts val="1977"/>
               </a:spcBef>
               <a:spcAft>
                 <a:spcPts val="1416"/>
@@ -23482,7 +23477,7 @@
                 <a:spcPct val="100000"/>
               </a:lnSpc>
               <a:spcBef>
-                <a:spcPts val="1978"/>
+                <a:spcPts val="1977"/>
               </a:spcBef>
               <a:spcAft>
                 <a:spcPts val="1416"/>
@@ -23521,7 +23516,7 @@
                 <a:spcPct val="100000"/>
               </a:lnSpc>
               <a:spcBef>
-                <a:spcPts val="1978"/>
+                <a:spcPts val="1977"/>
               </a:spcBef>
               <a:spcAft>
                 <a:spcPts val="1416"/>

</xml_diff>